<commit_message>
Massive refactoring and hardening.
[Fixed] * The day gantt total time vs the time shown in the effort graphs
[Fixed] * Thermometer tile ghost border
[Fixed] * The L30 effort graph in syllabus view does not dynamically update
[Fixed] * Both session and syllabus time for today needs display on Session screen
</commit_message>
<xml_diff>
--- a/doc/Event Flow.pptx
+++ b/doc/Event Flow.pptx
@@ -2,12 +2,12 @@
 <file path=ppt/presentation.xml><?xml version="1.0" encoding="utf-8"?>
 <p:presentation xmlns:a="http://schemas.openxmlformats.org/drawingml/2006/main" xmlns:r="http://schemas.openxmlformats.org/officeDocument/2006/relationships" xmlns:p="http://schemas.openxmlformats.org/presentationml/2006/main" saveSubsetFonts="1" autoCompressPictures="0">
   <p:sldMasterIdLst>
-    <p:sldMasterId id="2147483672" r:id="rId1"/>
+    <p:sldMasterId id="2147483684" r:id="rId1"/>
   </p:sldMasterIdLst>
   <p:sldIdLst>
     <p:sldId id="256" r:id="rId2"/>
   </p:sldIdLst>
-  <p:sldSz cx="14400213" cy="18000663"/>
+  <p:sldSz cx="18000663" cy="18000663"/>
   <p:notesSz cx="6858000" cy="9144000"/>
   <p:defaultTextStyle>
     <a:defPPr>
@@ -136,15 +136,15 @@
         </p:nvSpPr>
         <p:spPr>
           <a:xfrm>
-            <a:off x="1080016" y="2945943"/>
-            <a:ext cx="12240181" cy="6266897"/>
+            <a:off x="1350050" y="2945943"/>
+            <a:ext cx="15300564" cy="6266897"/>
           </a:xfrm>
         </p:spPr>
         <p:txBody>
           <a:bodyPr anchor="b"/>
           <a:lstStyle>
             <a:lvl1pPr algn="ctr">
-              <a:defRPr sz="9449"/>
+              <a:defRPr sz="11812"/>
             </a:lvl1pPr>
           </a:lstStyle>
           <a:p>
@@ -168,8 +168,8 @@
         </p:nvSpPr>
         <p:spPr>
           <a:xfrm>
-            <a:off x="1800027" y="9454516"/>
-            <a:ext cx="10800160" cy="4345992"/>
+            <a:off x="2250083" y="9454516"/>
+            <a:ext cx="13500497" cy="4345992"/>
           </a:xfrm>
         </p:spPr>
         <p:txBody>
@@ -177,39 +177,39 @@
           <a:lstStyle>
             <a:lvl1pPr marL="0" indent="0" algn="ctr">
               <a:buNone/>
-              <a:defRPr sz="3780"/>
+              <a:defRPr sz="4725"/>
             </a:lvl1pPr>
-            <a:lvl2pPr marL="719999" indent="0" algn="ctr">
+            <a:lvl2pPr marL="900044" indent="0" algn="ctr">
+              <a:buNone/>
+              <a:defRPr sz="3937"/>
+            </a:lvl2pPr>
+            <a:lvl3pPr marL="1800088" indent="0" algn="ctr">
+              <a:buNone/>
+              <a:defRPr sz="3543"/>
+            </a:lvl3pPr>
+            <a:lvl4pPr marL="2700132" indent="0" algn="ctr">
               <a:buNone/>
               <a:defRPr sz="3150"/>
-            </a:lvl2pPr>
-            <a:lvl3pPr marL="1439997" indent="0" algn="ctr">
+            </a:lvl4pPr>
+            <a:lvl5pPr marL="3600176" indent="0" algn="ctr">
               <a:buNone/>
-              <a:defRPr sz="2835"/>
-            </a:lvl3pPr>
-            <a:lvl4pPr marL="2159996" indent="0" algn="ctr">
+              <a:defRPr sz="3150"/>
+            </a:lvl5pPr>
+            <a:lvl6pPr marL="4500220" indent="0" algn="ctr">
               <a:buNone/>
-              <a:defRPr sz="2520"/>
-            </a:lvl4pPr>
-            <a:lvl5pPr marL="2879994" indent="0" algn="ctr">
+              <a:defRPr sz="3150"/>
+            </a:lvl6pPr>
+            <a:lvl7pPr marL="5400264" indent="0" algn="ctr">
               <a:buNone/>
-              <a:defRPr sz="2520"/>
-            </a:lvl5pPr>
-            <a:lvl6pPr marL="3599993" indent="0" algn="ctr">
+              <a:defRPr sz="3150"/>
+            </a:lvl7pPr>
+            <a:lvl8pPr marL="6300307" indent="0" algn="ctr">
               <a:buNone/>
-              <a:defRPr sz="2520"/>
-            </a:lvl6pPr>
-            <a:lvl7pPr marL="4319991" indent="0" algn="ctr">
+              <a:defRPr sz="3150"/>
+            </a:lvl8pPr>
+            <a:lvl9pPr marL="7200351" indent="0" algn="ctr">
               <a:buNone/>
-              <a:defRPr sz="2520"/>
-            </a:lvl7pPr>
-            <a:lvl8pPr marL="5039990" indent="0" algn="ctr">
-              <a:buNone/>
-              <a:defRPr sz="2520"/>
-            </a:lvl8pPr>
-            <a:lvl9pPr marL="5759988" indent="0" algn="ctr">
-              <a:buNone/>
-              <a:defRPr sz="2520"/>
+              <a:defRPr sz="3150"/>
             </a:lvl9pPr>
           </a:lstStyle>
           <a:p>
@@ -289,7 +289,7 @@
     </p:spTree>
     <p:extLst>
       <p:ext uri="{BB962C8B-B14F-4D97-AF65-F5344CB8AC3E}">
-        <p14:creationId xmlns:p14="http://schemas.microsoft.com/office/powerpoint/2010/main" val="2350975889"/>
+        <p14:creationId xmlns:p14="http://schemas.microsoft.com/office/powerpoint/2010/main" val="16686676"/>
       </p:ext>
     </p:extLst>
   </p:cSld>
@@ -459,7 +459,7 @@
     </p:spTree>
     <p:extLst>
       <p:ext uri="{BB962C8B-B14F-4D97-AF65-F5344CB8AC3E}">
-        <p14:creationId xmlns:p14="http://schemas.microsoft.com/office/powerpoint/2010/main" val="2367851414"/>
+        <p14:creationId xmlns:p14="http://schemas.microsoft.com/office/powerpoint/2010/main" val="1609270902"/>
       </p:ext>
     </p:extLst>
   </p:cSld>
@@ -498,8 +498,8 @@
         </p:nvSpPr>
         <p:spPr>
           <a:xfrm>
-            <a:off x="10305153" y="958369"/>
-            <a:ext cx="3105046" cy="15254730"/>
+            <a:off x="12881725" y="958369"/>
+            <a:ext cx="3881393" cy="15254730"/>
           </a:xfrm>
         </p:spPr>
         <p:txBody>
@@ -526,8 +526,8 @@
         </p:nvSpPr>
         <p:spPr>
           <a:xfrm>
-            <a:off x="990015" y="958369"/>
-            <a:ext cx="9135135" cy="15254730"/>
+            <a:off x="1237546" y="958369"/>
+            <a:ext cx="11419171" cy="15254730"/>
           </a:xfrm>
         </p:spPr>
         <p:txBody>
@@ -639,7 +639,7 @@
     </p:spTree>
     <p:extLst>
       <p:ext uri="{BB962C8B-B14F-4D97-AF65-F5344CB8AC3E}">
-        <p14:creationId xmlns:p14="http://schemas.microsoft.com/office/powerpoint/2010/main" val="2423566732"/>
+        <p14:creationId xmlns:p14="http://schemas.microsoft.com/office/powerpoint/2010/main" val="59211713"/>
       </p:ext>
     </p:extLst>
   </p:cSld>
@@ -809,7 +809,7 @@
     </p:spTree>
     <p:extLst>
       <p:ext uri="{BB962C8B-B14F-4D97-AF65-F5344CB8AC3E}">
-        <p14:creationId xmlns:p14="http://schemas.microsoft.com/office/powerpoint/2010/main" val="773922327"/>
+        <p14:creationId xmlns:p14="http://schemas.microsoft.com/office/powerpoint/2010/main" val="1146324169"/>
       </p:ext>
     </p:extLst>
   </p:cSld>
@@ -848,15 +848,15 @@
         </p:nvSpPr>
         <p:spPr>
           <a:xfrm>
-            <a:off x="982515" y="4487671"/>
-            <a:ext cx="12420184" cy="7487774"/>
+            <a:off x="1228171" y="4487671"/>
+            <a:ext cx="15525572" cy="7487774"/>
           </a:xfrm>
         </p:spPr>
         <p:txBody>
           <a:bodyPr anchor="b"/>
           <a:lstStyle>
             <a:lvl1pPr>
-              <a:defRPr sz="9449"/>
+              <a:defRPr sz="11812"/>
             </a:lvl1pPr>
           </a:lstStyle>
           <a:p>
@@ -880,8 +880,8 @@
         </p:nvSpPr>
         <p:spPr>
           <a:xfrm>
-            <a:off x="982515" y="12046282"/>
-            <a:ext cx="12420184" cy="3937644"/>
+            <a:off x="1228171" y="12046282"/>
+            <a:ext cx="15525572" cy="3937644"/>
           </a:xfrm>
         </p:spPr>
         <p:txBody>
@@ -889,7 +889,7 @@
           <a:lstStyle>
             <a:lvl1pPr marL="0" indent="0">
               <a:buNone/>
-              <a:defRPr sz="3780">
+              <a:defRPr sz="4725">
                 <a:solidFill>
                   <a:schemeClr val="tx1">
                     <a:tint val="82000"/>
@@ -897,7 +897,27 @@
                 </a:solidFill>
               </a:defRPr>
             </a:lvl1pPr>
-            <a:lvl2pPr marL="719999" indent="0">
+            <a:lvl2pPr marL="900044" indent="0">
+              <a:buNone/>
+              <a:defRPr sz="3937">
+                <a:solidFill>
+                  <a:schemeClr val="tx1">
+                    <a:tint val="82000"/>
+                  </a:schemeClr>
+                </a:solidFill>
+              </a:defRPr>
+            </a:lvl2pPr>
+            <a:lvl3pPr marL="1800088" indent="0">
+              <a:buNone/>
+              <a:defRPr sz="3543">
+                <a:solidFill>
+                  <a:schemeClr val="tx1">
+                    <a:tint val="82000"/>
+                  </a:schemeClr>
+                </a:solidFill>
+              </a:defRPr>
+            </a:lvl3pPr>
+            <a:lvl4pPr marL="2700132" indent="0">
               <a:buNone/>
               <a:defRPr sz="3150">
                 <a:solidFill>
@@ -906,30 +926,10 @@
                   </a:schemeClr>
                 </a:solidFill>
               </a:defRPr>
-            </a:lvl2pPr>
-            <a:lvl3pPr marL="1439997" indent="0">
+            </a:lvl4pPr>
+            <a:lvl5pPr marL="3600176" indent="0">
               <a:buNone/>
-              <a:defRPr sz="2835">
-                <a:solidFill>
-                  <a:schemeClr val="tx1">
-                    <a:tint val="82000"/>
-                  </a:schemeClr>
-                </a:solidFill>
-              </a:defRPr>
-            </a:lvl3pPr>
-            <a:lvl4pPr marL="2159996" indent="0">
-              <a:buNone/>
-              <a:defRPr sz="2520">
-                <a:solidFill>
-                  <a:schemeClr val="tx1">
-                    <a:tint val="82000"/>
-                  </a:schemeClr>
-                </a:solidFill>
-              </a:defRPr>
-            </a:lvl4pPr>
-            <a:lvl5pPr marL="2879994" indent="0">
-              <a:buNone/>
-              <a:defRPr sz="2520">
+              <a:defRPr sz="3150">
                 <a:solidFill>
                   <a:schemeClr val="tx1">
                     <a:tint val="82000"/>
@@ -937,9 +937,9 @@
                 </a:solidFill>
               </a:defRPr>
             </a:lvl5pPr>
-            <a:lvl6pPr marL="3599993" indent="0">
+            <a:lvl6pPr marL="4500220" indent="0">
               <a:buNone/>
-              <a:defRPr sz="2520">
+              <a:defRPr sz="3150">
                 <a:solidFill>
                   <a:schemeClr val="tx1">
                     <a:tint val="82000"/>
@@ -947,9 +947,9 @@
                 </a:solidFill>
               </a:defRPr>
             </a:lvl6pPr>
-            <a:lvl7pPr marL="4319991" indent="0">
+            <a:lvl7pPr marL="5400264" indent="0">
               <a:buNone/>
-              <a:defRPr sz="2520">
+              <a:defRPr sz="3150">
                 <a:solidFill>
                   <a:schemeClr val="tx1">
                     <a:tint val="82000"/>
@@ -957,9 +957,9 @@
                 </a:solidFill>
               </a:defRPr>
             </a:lvl7pPr>
-            <a:lvl8pPr marL="5039990" indent="0">
+            <a:lvl8pPr marL="6300307" indent="0">
               <a:buNone/>
-              <a:defRPr sz="2520">
+              <a:defRPr sz="3150">
                 <a:solidFill>
                   <a:schemeClr val="tx1">
                     <a:tint val="82000"/>
@@ -967,9 +967,9 @@
                 </a:solidFill>
               </a:defRPr>
             </a:lvl8pPr>
-            <a:lvl9pPr marL="5759988" indent="0">
+            <a:lvl9pPr marL="7200351" indent="0">
               <a:buNone/>
-              <a:defRPr sz="2520">
+              <a:defRPr sz="3150">
                 <a:solidFill>
                   <a:schemeClr val="tx1">
                     <a:tint val="82000"/>
@@ -1055,7 +1055,7 @@
     </p:spTree>
     <p:extLst>
       <p:ext uri="{BB962C8B-B14F-4D97-AF65-F5344CB8AC3E}">
-        <p14:creationId xmlns:p14="http://schemas.microsoft.com/office/powerpoint/2010/main" val="3411459331"/>
+        <p14:creationId xmlns:p14="http://schemas.microsoft.com/office/powerpoint/2010/main" val="613867113"/>
       </p:ext>
     </p:extLst>
   </p:cSld>
@@ -1117,8 +1117,8 @@
         </p:nvSpPr>
         <p:spPr>
           <a:xfrm>
-            <a:off x="990014" y="4791843"/>
-            <a:ext cx="6120091" cy="11421255"/>
+            <a:off x="1237545" y="4791843"/>
+            <a:ext cx="7650282" cy="11421255"/>
           </a:xfrm>
         </p:spPr>
         <p:txBody>
@@ -1174,8 +1174,8 @@
         </p:nvSpPr>
         <p:spPr>
           <a:xfrm>
-            <a:off x="7290108" y="4791843"/>
-            <a:ext cx="6120091" cy="11421255"/>
+            <a:off x="9112836" y="4791843"/>
+            <a:ext cx="7650282" cy="11421255"/>
           </a:xfrm>
         </p:spPr>
         <p:txBody>
@@ -1287,7 +1287,7 @@
     </p:spTree>
     <p:extLst>
       <p:ext uri="{BB962C8B-B14F-4D97-AF65-F5344CB8AC3E}">
-        <p14:creationId xmlns:p14="http://schemas.microsoft.com/office/powerpoint/2010/main" val="739817985"/>
+        <p14:creationId xmlns:p14="http://schemas.microsoft.com/office/powerpoint/2010/main" val="672764763"/>
       </p:ext>
     </p:extLst>
   </p:cSld>
@@ -1326,8 +1326,8 @@
         </p:nvSpPr>
         <p:spPr>
           <a:xfrm>
-            <a:off x="991890" y="958373"/>
-            <a:ext cx="12420184" cy="3479296"/>
+            <a:off x="1239890" y="958373"/>
+            <a:ext cx="15525572" cy="3479296"/>
           </a:xfrm>
         </p:spPr>
         <p:txBody>
@@ -1354,8 +1354,8 @@
         </p:nvSpPr>
         <p:spPr>
           <a:xfrm>
-            <a:off x="991892" y="4412664"/>
-            <a:ext cx="6091964" cy="2162578"/>
+            <a:off x="1239892" y="4412664"/>
+            <a:ext cx="7615123" cy="2162578"/>
           </a:xfrm>
         </p:spPr>
         <p:txBody>
@@ -1363,39 +1363,39 @@
           <a:lstStyle>
             <a:lvl1pPr marL="0" indent="0">
               <a:buNone/>
-              <a:defRPr sz="3780" b="1"/>
+              <a:defRPr sz="4725" b="1"/>
             </a:lvl1pPr>
-            <a:lvl2pPr marL="719999" indent="0">
+            <a:lvl2pPr marL="900044" indent="0">
+              <a:buNone/>
+              <a:defRPr sz="3937" b="1"/>
+            </a:lvl2pPr>
+            <a:lvl3pPr marL="1800088" indent="0">
+              <a:buNone/>
+              <a:defRPr sz="3543" b="1"/>
+            </a:lvl3pPr>
+            <a:lvl4pPr marL="2700132" indent="0">
               <a:buNone/>
               <a:defRPr sz="3150" b="1"/>
-            </a:lvl2pPr>
-            <a:lvl3pPr marL="1439997" indent="0">
+            </a:lvl4pPr>
+            <a:lvl5pPr marL="3600176" indent="0">
               <a:buNone/>
-              <a:defRPr sz="2835" b="1"/>
-            </a:lvl3pPr>
-            <a:lvl4pPr marL="2159996" indent="0">
+              <a:defRPr sz="3150" b="1"/>
+            </a:lvl5pPr>
+            <a:lvl6pPr marL="4500220" indent="0">
               <a:buNone/>
-              <a:defRPr sz="2520" b="1"/>
-            </a:lvl4pPr>
-            <a:lvl5pPr marL="2879994" indent="0">
+              <a:defRPr sz="3150" b="1"/>
+            </a:lvl6pPr>
+            <a:lvl7pPr marL="5400264" indent="0">
               <a:buNone/>
-              <a:defRPr sz="2520" b="1"/>
-            </a:lvl5pPr>
-            <a:lvl6pPr marL="3599993" indent="0">
+              <a:defRPr sz="3150" b="1"/>
+            </a:lvl7pPr>
+            <a:lvl8pPr marL="6300307" indent="0">
               <a:buNone/>
-              <a:defRPr sz="2520" b="1"/>
-            </a:lvl6pPr>
-            <a:lvl7pPr marL="4319991" indent="0">
+              <a:defRPr sz="3150" b="1"/>
+            </a:lvl8pPr>
+            <a:lvl9pPr marL="7200351" indent="0">
               <a:buNone/>
-              <a:defRPr sz="2520" b="1"/>
-            </a:lvl7pPr>
-            <a:lvl8pPr marL="5039990" indent="0">
-              <a:buNone/>
-              <a:defRPr sz="2520" b="1"/>
-            </a:lvl8pPr>
-            <a:lvl9pPr marL="5759988" indent="0">
-              <a:buNone/>
-              <a:defRPr sz="2520" b="1"/>
+              <a:defRPr sz="3150" b="1"/>
             </a:lvl9pPr>
           </a:lstStyle>
           <a:p>
@@ -1419,8 +1419,8 @@
         </p:nvSpPr>
         <p:spPr>
           <a:xfrm>
-            <a:off x="991892" y="6575242"/>
-            <a:ext cx="6091964" cy="9671191"/>
+            <a:off x="1239892" y="6575242"/>
+            <a:ext cx="7615123" cy="9671191"/>
           </a:xfrm>
         </p:spPr>
         <p:txBody>
@@ -1476,8 +1476,8 @@
         </p:nvSpPr>
         <p:spPr>
           <a:xfrm>
-            <a:off x="7290109" y="4412664"/>
-            <a:ext cx="6121966" cy="2162578"/>
+            <a:off x="9112837" y="4412664"/>
+            <a:ext cx="7652626" cy="2162578"/>
           </a:xfrm>
         </p:spPr>
         <p:txBody>
@@ -1485,39 +1485,39 @@
           <a:lstStyle>
             <a:lvl1pPr marL="0" indent="0">
               <a:buNone/>
-              <a:defRPr sz="3780" b="1"/>
+              <a:defRPr sz="4725" b="1"/>
             </a:lvl1pPr>
-            <a:lvl2pPr marL="719999" indent="0">
+            <a:lvl2pPr marL="900044" indent="0">
+              <a:buNone/>
+              <a:defRPr sz="3937" b="1"/>
+            </a:lvl2pPr>
+            <a:lvl3pPr marL="1800088" indent="0">
+              <a:buNone/>
+              <a:defRPr sz="3543" b="1"/>
+            </a:lvl3pPr>
+            <a:lvl4pPr marL="2700132" indent="0">
               <a:buNone/>
               <a:defRPr sz="3150" b="1"/>
-            </a:lvl2pPr>
-            <a:lvl3pPr marL="1439997" indent="0">
+            </a:lvl4pPr>
+            <a:lvl5pPr marL="3600176" indent="0">
               <a:buNone/>
-              <a:defRPr sz="2835" b="1"/>
-            </a:lvl3pPr>
-            <a:lvl4pPr marL="2159996" indent="0">
+              <a:defRPr sz="3150" b="1"/>
+            </a:lvl5pPr>
+            <a:lvl6pPr marL="4500220" indent="0">
               <a:buNone/>
-              <a:defRPr sz="2520" b="1"/>
-            </a:lvl4pPr>
-            <a:lvl5pPr marL="2879994" indent="0">
+              <a:defRPr sz="3150" b="1"/>
+            </a:lvl6pPr>
+            <a:lvl7pPr marL="5400264" indent="0">
               <a:buNone/>
-              <a:defRPr sz="2520" b="1"/>
-            </a:lvl5pPr>
-            <a:lvl6pPr marL="3599993" indent="0">
+              <a:defRPr sz="3150" b="1"/>
+            </a:lvl7pPr>
+            <a:lvl8pPr marL="6300307" indent="0">
               <a:buNone/>
-              <a:defRPr sz="2520" b="1"/>
-            </a:lvl6pPr>
-            <a:lvl7pPr marL="4319991" indent="0">
+              <a:defRPr sz="3150" b="1"/>
+            </a:lvl8pPr>
+            <a:lvl9pPr marL="7200351" indent="0">
               <a:buNone/>
-              <a:defRPr sz="2520" b="1"/>
-            </a:lvl7pPr>
-            <a:lvl8pPr marL="5039990" indent="0">
-              <a:buNone/>
-              <a:defRPr sz="2520" b="1"/>
-            </a:lvl8pPr>
-            <a:lvl9pPr marL="5759988" indent="0">
-              <a:buNone/>
-              <a:defRPr sz="2520" b="1"/>
+              <a:defRPr sz="3150" b="1"/>
             </a:lvl9pPr>
           </a:lstStyle>
           <a:p>
@@ -1541,8 +1541,8 @@
         </p:nvSpPr>
         <p:spPr>
           <a:xfrm>
-            <a:off x="7290109" y="6575242"/>
-            <a:ext cx="6121966" cy="9671191"/>
+            <a:off x="9112837" y="6575242"/>
+            <a:ext cx="7652626" cy="9671191"/>
           </a:xfrm>
         </p:spPr>
         <p:txBody>
@@ -1654,7 +1654,7 @@
     </p:spTree>
     <p:extLst>
       <p:ext uri="{BB962C8B-B14F-4D97-AF65-F5344CB8AC3E}">
-        <p14:creationId xmlns:p14="http://schemas.microsoft.com/office/powerpoint/2010/main" val="2522335574"/>
+        <p14:creationId xmlns:p14="http://schemas.microsoft.com/office/powerpoint/2010/main" val="260833333"/>
       </p:ext>
     </p:extLst>
   </p:cSld>
@@ -1772,7 +1772,7 @@
     </p:spTree>
     <p:extLst>
       <p:ext uri="{BB962C8B-B14F-4D97-AF65-F5344CB8AC3E}">
-        <p14:creationId xmlns:p14="http://schemas.microsoft.com/office/powerpoint/2010/main" val="2454900020"/>
+        <p14:creationId xmlns:p14="http://schemas.microsoft.com/office/powerpoint/2010/main" val="1243264537"/>
       </p:ext>
     </p:extLst>
   </p:cSld>
@@ -1867,7 +1867,7 @@
     </p:spTree>
     <p:extLst>
       <p:ext uri="{BB962C8B-B14F-4D97-AF65-F5344CB8AC3E}">
-        <p14:creationId xmlns:p14="http://schemas.microsoft.com/office/powerpoint/2010/main" val="2408707964"/>
+        <p14:creationId xmlns:p14="http://schemas.microsoft.com/office/powerpoint/2010/main" val="2382930466"/>
       </p:ext>
     </p:extLst>
   </p:cSld>
@@ -1906,15 +1906,15 @@
         </p:nvSpPr>
         <p:spPr>
           <a:xfrm>
-            <a:off x="991890" y="1200044"/>
-            <a:ext cx="4644444" cy="4200155"/>
+            <a:off x="1239890" y="1200044"/>
+            <a:ext cx="5805682" cy="4200155"/>
           </a:xfrm>
         </p:spPr>
         <p:txBody>
           <a:bodyPr anchor="b"/>
           <a:lstStyle>
             <a:lvl1pPr>
-              <a:defRPr sz="5039"/>
+              <a:defRPr sz="6300"/>
             </a:lvl1pPr>
           </a:lstStyle>
           <a:p>
@@ -1938,39 +1938,39 @@
         </p:nvSpPr>
         <p:spPr>
           <a:xfrm>
-            <a:off x="6121966" y="2591766"/>
-            <a:ext cx="7290108" cy="12792138"/>
+            <a:off x="7652626" y="2591766"/>
+            <a:ext cx="9112836" cy="12792138"/>
           </a:xfrm>
         </p:spPr>
         <p:txBody>
           <a:bodyPr/>
           <a:lstStyle>
             <a:lvl1pPr>
-              <a:defRPr sz="5039"/>
+              <a:defRPr sz="6300"/>
             </a:lvl1pPr>
             <a:lvl2pPr>
-              <a:defRPr sz="4409"/>
+              <a:defRPr sz="5512"/>
             </a:lvl2pPr>
             <a:lvl3pPr>
-              <a:defRPr sz="3780"/>
+              <a:defRPr sz="4725"/>
             </a:lvl3pPr>
             <a:lvl4pPr>
-              <a:defRPr sz="3150"/>
+              <a:defRPr sz="3937"/>
             </a:lvl4pPr>
             <a:lvl5pPr>
-              <a:defRPr sz="3150"/>
+              <a:defRPr sz="3937"/>
             </a:lvl5pPr>
             <a:lvl6pPr>
-              <a:defRPr sz="3150"/>
+              <a:defRPr sz="3937"/>
             </a:lvl6pPr>
             <a:lvl7pPr>
-              <a:defRPr sz="3150"/>
+              <a:defRPr sz="3937"/>
             </a:lvl7pPr>
             <a:lvl8pPr>
-              <a:defRPr sz="3150"/>
+              <a:defRPr sz="3937"/>
             </a:lvl8pPr>
             <a:lvl9pPr>
-              <a:defRPr sz="3150"/>
+              <a:defRPr sz="3937"/>
             </a:lvl9pPr>
           </a:lstStyle>
           <a:p>
@@ -2023,8 +2023,8 @@
         </p:nvSpPr>
         <p:spPr>
           <a:xfrm>
-            <a:off x="991890" y="5400199"/>
-            <a:ext cx="4644444" cy="10004536"/>
+            <a:off x="1239890" y="5400199"/>
+            <a:ext cx="5805682" cy="10004536"/>
           </a:xfrm>
         </p:spPr>
         <p:txBody>
@@ -2032,39 +2032,39 @@
           <a:lstStyle>
             <a:lvl1pPr marL="0" indent="0">
               <a:buNone/>
-              <a:defRPr sz="2520"/>
+              <a:defRPr sz="3150"/>
             </a:lvl1pPr>
-            <a:lvl2pPr marL="719999" indent="0">
+            <a:lvl2pPr marL="900044" indent="0">
               <a:buNone/>
-              <a:defRPr sz="2205"/>
+              <a:defRPr sz="2756"/>
             </a:lvl2pPr>
-            <a:lvl3pPr marL="1439997" indent="0">
+            <a:lvl3pPr marL="1800088" indent="0">
               <a:buNone/>
-              <a:defRPr sz="1890"/>
+              <a:defRPr sz="2362"/>
             </a:lvl3pPr>
-            <a:lvl4pPr marL="2159996" indent="0">
+            <a:lvl4pPr marL="2700132" indent="0">
               <a:buNone/>
-              <a:defRPr sz="1575"/>
+              <a:defRPr sz="1969"/>
             </a:lvl4pPr>
-            <a:lvl5pPr marL="2879994" indent="0">
+            <a:lvl5pPr marL="3600176" indent="0">
               <a:buNone/>
-              <a:defRPr sz="1575"/>
+              <a:defRPr sz="1969"/>
             </a:lvl5pPr>
-            <a:lvl6pPr marL="3599993" indent="0">
+            <a:lvl6pPr marL="4500220" indent="0">
               <a:buNone/>
-              <a:defRPr sz="1575"/>
+              <a:defRPr sz="1969"/>
             </a:lvl6pPr>
-            <a:lvl7pPr marL="4319991" indent="0">
+            <a:lvl7pPr marL="5400264" indent="0">
               <a:buNone/>
-              <a:defRPr sz="1575"/>
+              <a:defRPr sz="1969"/>
             </a:lvl7pPr>
-            <a:lvl8pPr marL="5039990" indent="0">
+            <a:lvl8pPr marL="6300307" indent="0">
               <a:buNone/>
-              <a:defRPr sz="1575"/>
+              <a:defRPr sz="1969"/>
             </a:lvl8pPr>
-            <a:lvl9pPr marL="5759988" indent="0">
+            <a:lvl9pPr marL="7200351" indent="0">
               <a:buNone/>
-              <a:defRPr sz="1575"/>
+              <a:defRPr sz="1969"/>
             </a:lvl9pPr>
           </a:lstStyle>
           <a:p>
@@ -2144,7 +2144,7 @@
     </p:spTree>
     <p:extLst>
       <p:ext uri="{BB962C8B-B14F-4D97-AF65-F5344CB8AC3E}">
-        <p14:creationId xmlns:p14="http://schemas.microsoft.com/office/powerpoint/2010/main" val="1018375393"/>
+        <p14:creationId xmlns:p14="http://schemas.microsoft.com/office/powerpoint/2010/main" val="446858077"/>
       </p:ext>
     </p:extLst>
   </p:cSld>
@@ -2183,15 +2183,15 @@
         </p:nvSpPr>
         <p:spPr>
           <a:xfrm>
-            <a:off x="991890" y="1200044"/>
-            <a:ext cx="4644444" cy="4200155"/>
+            <a:off x="1239890" y="1200044"/>
+            <a:ext cx="5805682" cy="4200155"/>
           </a:xfrm>
         </p:spPr>
         <p:txBody>
           <a:bodyPr anchor="b"/>
           <a:lstStyle>
             <a:lvl1pPr>
-              <a:defRPr sz="5039"/>
+              <a:defRPr sz="6300"/>
             </a:lvl1pPr>
           </a:lstStyle>
           <a:p>
@@ -2215,8 +2215,8 @@
         </p:nvSpPr>
         <p:spPr>
           <a:xfrm>
-            <a:off x="6121966" y="2591766"/>
-            <a:ext cx="7290108" cy="12792138"/>
+            <a:off x="7652626" y="2591766"/>
+            <a:ext cx="9112836" cy="12792138"/>
           </a:xfrm>
         </p:spPr>
         <p:txBody>
@@ -2224,39 +2224,39 @@
           <a:lstStyle>
             <a:lvl1pPr marL="0" indent="0">
               <a:buNone/>
-              <a:defRPr sz="5039"/>
+              <a:defRPr sz="6300"/>
             </a:lvl1pPr>
-            <a:lvl2pPr marL="719999" indent="0">
+            <a:lvl2pPr marL="900044" indent="0">
               <a:buNone/>
-              <a:defRPr sz="4409"/>
+              <a:defRPr sz="5512"/>
             </a:lvl2pPr>
-            <a:lvl3pPr marL="1439997" indent="0">
+            <a:lvl3pPr marL="1800088" indent="0">
               <a:buNone/>
-              <a:defRPr sz="3780"/>
+              <a:defRPr sz="4725"/>
             </a:lvl3pPr>
-            <a:lvl4pPr marL="2159996" indent="0">
+            <a:lvl4pPr marL="2700132" indent="0">
               <a:buNone/>
-              <a:defRPr sz="3150"/>
+              <a:defRPr sz="3937"/>
             </a:lvl4pPr>
-            <a:lvl5pPr marL="2879994" indent="0">
+            <a:lvl5pPr marL="3600176" indent="0">
               <a:buNone/>
-              <a:defRPr sz="3150"/>
+              <a:defRPr sz="3937"/>
             </a:lvl5pPr>
-            <a:lvl6pPr marL="3599993" indent="0">
+            <a:lvl6pPr marL="4500220" indent="0">
               <a:buNone/>
-              <a:defRPr sz="3150"/>
+              <a:defRPr sz="3937"/>
             </a:lvl6pPr>
-            <a:lvl7pPr marL="4319991" indent="0">
+            <a:lvl7pPr marL="5400264" indent="0">
               <a:buNone/>
-              <a:defRPr sz="3150"/>
+              <a:defRPr sz="3937"/>
             </a:lvl7pPr>
-            <a:lvl8pPr marL="5039990" indent="0">
+            <a:lvl8pPr marL="6300307" indent="0">
               <a:buNone/>
-              <a:defRPr sz="3150"/>
+              <a:defRPr sz="3937"/>
             </a:lvl8pPr>
-            <a:lvl9pPr marL="5759988" indent="0">
+            <a:lvl9pPr marL="7200351" indent="0">
               <a:buNone/>
-              <a:defRPr sz="3150"/>
+              <a:defRPr sz="3937"/>
             </a:lvl9pPr>
           </a:lstStyle>
           <a:p>
@@ -2280,8 +2280,8 @@
         </p:nvSpPr>
         <p:spPr>
           <a:xfrm>
-            <a:off x="991890" y="5400199"/>
-            <a:ext cx="4644444" cy="10004536"/>
+            <a:off x="1239890" y="5400199"/>
+            <a:ext cx="5805682" cy="10004536"/>
           </a:xfrm>
         </p:spPr>
         <p:txBody>
@@ -2289,39 +2289,39 @@
           <a:lstStyle>
             <a:lvl1pPr marL="0" indent="0">
               <a:buNone/>
-              <a:defRPr sz="2520"/>
+              <a:defRPr sz="3150"/>
             </a:lvl1pPr>
-            <a:lvl2pPr marL="719999" indent="0">
+            <a:lvl2pPr marL="900044" indent="0">
               <a:buNone/>
-              <a:defRPr sz="2205"/>
+              <a:defRPr sz="2756"/>
             </a:lvl2pPr>
-            <a:lvl3pPr marL="1439997" indent="0">
+            <a:lvl3pPr marL="1800088" indent="0">
               <a:buNone/>
-              <a:defRPr sz="1890"/>
+              <a:defRPr sz="2362"/>
             </a:lvl3pPr>
-            <a:lvl4pPr marL="2159996" indent="0">
+            <a:lvl4pPr marL="2700132" indent="0">
               <a:buNone/>
-              <a:defRPr sz="1575"/>
+              <a:defRPr sz="1969"/>
             </a:lvl4pPr>
-            <a:lvl5pPr marL="2879994" indent="0">
+            <a:lvl5pPr marL="3600176" indent="0">
               <a:buNone/>
-              <a:defRPr sz="1575"/>
+              <a:defRPr sz="1969"/>
             </a:lvl5pPr>
-            <a:lvl6pPr marL="3599993" indent="0">
+            <a:lvl6pPr marL="4500220" indent="0">
               <a:buNone/>
-              <a:defRPr sz="1575"/>
+              <a:defRPr sz="1969"/>
             </a:lvl6pPr>
-            <a:lvl7pPr marL="4319991" indent="0">
+            <a:lvl7pPr marL="5400264" indent="0">
               <a:buNone/>
-              <a:defRPr sz="1575"/>
+              <a:defRPr sz="1969"/>
             </a:lvl7pPr>
-            <a:lvl8pPr marL="5039990" indent="0">
+            <a:lvl8pPr marL="6300307" indent="0">
               <a:buNone/>
-              <a:defRPr sz="1575"/>
+              <a:defRPr sz="1969"/>
             </a:lvl8pPr>
-            <a:lvl9pPr marL="5759988" indent="0">
+            <a:lvl9pPr marL="7200351" indent="0">
               <a:buNone/>
-              <a:defRPr sz="1575"/>
+              <a:defRPr sz="1969"/>
             </a:lvl9pPr>
           </a:lstStyle>
           <a:p>
@@ -2401,7 +2401,7 @@
     </p:spTree>
     <p:extLst>
       <p:ext uri="{BB962C8B-B14F-4D97-AF65-F5344CB8AC3E}">
-        <p14:creationId xmlns:p14="http://schemas.microsoft.com/office/powerpoint/2010/main" val="3277497394"/>
+        <p14:creationId xmlns:p14="http://schemas.microsoft.com/office/powerpoint/2010/main" val="4243124813"/>
       </p:ext>
     </p:extLst>
   </p:cSld>
@@ -2445,8 +2445,8 @@
         </p:nvSpPr>
         <p:spPr>
           <a:xfrm>
-            <a:off x="990015" y="958373"/>
-            <a:ext cx="12420184" cy="3479296"/>
+            <a:off x="1237546" y="958373"/>
+            <a:ext cx="15525572" cy="3479296"/>
           </a:xfrm>
           <a:prstGeom prst="rect">
             <a:avLst/>
@@ -2478,8 +2478,8 @@
         </p:nvSpPr>
         <p:spPr>
           <a:xfrm>
-            <a:off x="990015" y="4791843"/>
-            <a:ext cx="12420184" cy="11421255"/>
+            <a:off x="1237546" y="4791843"/>
+            <a:ext cx="15525572" cy="11421255"/>
           </a:xfrm>
           <a:prstGeom prst="rect">
             <a:avLst/>
@@ -2540,8 +2540,8 @@
         </p:nvSpPr>
         <p:spPr>
           <a:xfrm>
-            <a:off x="990015" y="16683952"/>
-            <a:ext cx="3240048" cy="958369"/>
+            <a:off x="1237546" y="16683952"/>
+            <a:ext cx="4050149" cy="958369"/>
           </a:xfrm>
           <a:prstGeom prst="rect">
             <a:avLst/>
@@ -2551,7 +2551,7 @@
           <a:bodyPr vert="horz" lIns="91440" tIns="45720" rIns="91440" bIns="45720" rtlCol="0" anchor="ctr"/>
           <a:lstStyle>
             <a:lvl1pPr algn="l">
-              <a:defRPr sz="1890">
+              <a:defRPr sz="2362">
                 <a:solidFill>
                   <a:schemeClr val="tx1">
                     <a:tint val="82000"/>
@@ -2581,8 +2581,8 @@
         </p:nvSpPr>
         <p:spPr>
           <a:xfrm>
-            <a:off x="4770071" y="16683952"/>
-            <a:ext cx="4860072" cy="958369"/>
+            <a:off x="5962720" y="16683952"/>
+            <a:ext cx="6075224" cy="958369"/>
           </a:xfrm>
           <a:prstGeom prst="rect">
             <a:avLst/>
@@ -2592,7 +2592,7 @@
           <a:bodyPr vert="horz" lIns="91440" tIns="45720" rIns="91440" bIns="45720" rtlCol="0" anchor="ctr"/>
           <a:lstStyle>
             <a:lvl1pPr algn="ctr">
-              <a:defRPr sz="1890">
+              <a:defRPr sz="2362">
                 <a:solidFill>
                   <a:schemeClr val="tx1">
                     <a:tint val="82000"/>
@@ -2618,8 +2618,8 @@
         </p:nvSpPr>
         <p:spPr>
           <a:xfrm>
-            <a:off x="10170150" y="16683952"/>
-            <a:ext cx="3240048" cy="958369"/>
+            <a:off x="12712968" y="16683952"/>
+            <a:ext cx="4050149" cy="958369"/>
           </a:xfrm>
           <a:prstGeom prst="rect">
             <a:avLst/>
@@ -2629,7 +2629,7 @@
           <a:bodyPr vert="horz" lIns="91440" tIns="45720" rIns="91440" bIns="45720" rtlCol="0" anchor="ctr"/>
           <a:lstStyle>
             <a:lvl1pPr algn="r">
-              <a:defRPr sz="1890">
+              <a:defRPr sz="2362">
                 <a:solidFill>
                   <a:schemeClr val="tx1">
                     <a:tint val="82000"/>
@@ -2650,27 +2650,27 @@
     </p:spTree>
     <p:extLst>
       <p:ext uri="{BB962C8B-B14F-4D97-AF65-F5344CB8AC3E}">
-        <p14:creationId xmlns:p14="http://schemas.microsoft.com/office/powerpoint/2010/main" val="2666983476"/>
+        <p14:creationId xmlns:p14="http://schemas.microsoft.com/office/powerpoint/2010/main" val="3562584470"/>
       </p:ext>
     </p:extLst>
   </p:cSld>
   <p:clrMap bg1="lt1" tx1="dk1" bg2="lt2" tx2="dk2" accent1="accent1" accent2="accent2" accent3="accent3" accent4="accent4" accent5="accent5" accent6="accent6" hlink="hlink" folHlink="folHlink"/>
   <p:sldLayoutIdLst>
-    <p:sldLayoutId id="2147483673" r:id="rId1"/>
-    <p:sldLayoutId id="2147483674" r:id="rId2"/>
-    <p:sldLayoutId id="2147483675" r:id="rId3"/>
-    <p:sldLayoutId id="2147483676" r:id="rId4"/>
-    <p:sldLayoutId id="2147483677" r:id="rId5"/>
-    <p:sldLayoutId id="2147483678" r:id="rId6"/>
-    <p:sldLayoutId id="2147483679" r:id="rId7"/>
-    <p:sldLayoutId id="2147483680" r:id="rId8"/>
-    <p:sldLayoutId id="2147483681" r:id="rId9"/>
-    <p:sldLayoutId id="2147483682" r:id="rId10"/>
-    <p:sldLayoutId id="2147483683" r:id="rId11"/>
+    <p:sldLayoutId id="2147483685" r:id="rId1"/>
+    <p:sldLayoutId id="2147483686" r:id="rId2"/>
+    <p:sldLayoutId id="2147483687" r:id="rId3"/>
+    <p:sldLayoutId id="2147483688" r:id="rId4"/>
+    <p:sldLayoutId id="2147483689" r:id="rId5"/>
+    <p:sldLayoutId id="2147483690" r:id="rId6"/>
+    <p:sldLayoutId id="2147483691" r:id="rId7"/>
+    <p:sldLayoutId id="2147483692" r:id="rId8"/>
+    <p:sldLayoutId id="2147483693" r:id="rId9"/>
+    <p:sldLayoutId id="2147483694" r:id="rId10"/>
+    <p:sldLayoutId id="2147483695" r:id="rId11"/>
   </p:sldLayoutIdLst>
   <p:txStyles>
     <p:titleStyle>
-      <a:lvl1pPr algn="l" defTabSz="1439997" rtl="0" eaLnBrk="1" latinLnBrk="0" hangingPunct="1">
+      <a:lvl1pPr algn="l" defTabSz="1800088" rtl="0" eaLnBrk="1" latinLnBrk="0" hangingPunct="1">
         <a:lnSpc>
           <a:spcPct val="90000"/>
         </a:lnSpc>
@@ -2678,7 +2678,7 @@
           <a:spcPct val="0"/>
         </a:spcBef>
         <a:buNone/>
-        <a:defRPr sz="6929" kern="1200">
+        <a:defRPr sz="8662" kern="1200">
           <a:solidFill>
             <a:schemeClr val="tx1"/>
           </a:solidFill>
@@ -2689,16 +2689,16 @@
       </a:lvl1pPr>
     </p:titleStyle>
     <p:bodyStyle>
-      <a:lvl1pPr marL="359999" indent="-359999" algn="l" defTabSz="1439997" rtl="0" eaLnBrk="1" latinLnBrk="0" hangingPunct="1">
+      <a:lvl1pPr marL="450022" indent="-450022" algn="l" defTabSz="1800088" rtl="0" eaLnBrk="1" latinLnBrk="0" hangingPunct="1">
         <a:lnSpc>
           <a:spcPct val="90000"/>
         </a:lnSpc>
         <a:spcBef>
-          <a:spcPts val="1575"/>
+          <a:spcPts val="1969"/>
         </a:spcBef>
         <a:buFont typeface="Arial" panose="020B0604020202020204" pitchFamily="34" charset="0"/>
         <a:buChar char="•"/>
-        <a:defRPr sz="4409" kern="1200">
+        <a:defRPr sz="5512" kern="1200">
           <a:solidFill>
             <a:schemeClr val="tx1"/>
           </a:solidFill>
@@ -2707,16 +2707,16 @@
           <a:cs typeface="+mn-cs"/>
         </a:defRPr>
       </a:lvl1pPr>
-      <a:lvl2pPr marL="1079998" indent="-359999" algn="l" defTabSz="1439997" rtl="0" eaLnBrk="1" latinLnBrk="0" hangingPunct="1">
+      <a:lvl2pPr marL="1350066" indent="-450022" algn="l" defTabSz="1800088" rtl="0" eaLnBrk="1" latinLnBrk="0" hangingPunct="1">
         <a:lnSpc>
           <a:spcPct val="90000"/>
         </a:lnSpc>
         <a:spcBef>
-          <a:spcPts val="787"/>
+          <a:spcPts val="984"/>
         </a:spcBef>
         <a:buFont typeface="Arial" panose="020B0604020202020204" pitchFamily="34" charset="0"/>
         <a:buChar char="•"/>
-        <a:defRPr sz="3780" kern="1200">
+        <a:defRPr sz="4725" kern="1200">
           <a:solidFill>
             <a:schemeClr val="tx1"/>
           </a:solidFill>
@@ -2725,16 +2725,16 @@
           <a:cs typeface="+mn-cs"/>
         </a:defRPr>
       </a:lvl2pPr>
-      <a:lvl3pPr marL="1799996" indent="-359999" algn="l" defTabSz="1439997" rtl="0" eaLnBrk="1" latinLnBrk="0" hangingPunct="1">
+      <a:lvl3pPr marL="2250110" indent="-450022" algn="l" defTabSz="1800088" rtl="0" eaLnBrk="1" latinLnBrk="0" hangingPunct="1">
         <a:lnSpc>
           <a:spcPct val="90000"/>
         </a:lnSpc>
         <a:spcBef>
-          <a:spcPts val="787"/>
+          <a:spcPts val="984"/>
         </a:spcBef>
         <a:buFont typeface="Arial" panose="020B0604020202020204" pitchFamily="34" charset="0"/>
         <a:buChar char="•"/>
-        <a:defRPr sz="3150" kern="1200">
+        <a:defRPr sz="3937" kern="1200">
           <a:solidFill>
             <a:schemeClr val="tx1"/>
           </a:solidFill>
@@ -2743,16 +2743,16 @@
           <a:cs typeface="+mn-cs"/>
         </a:defRPr>
       </a:lvl3pPr>
-      <a:lvl4pPr marL="2519995" indent="-359999" algn="l" defTabSz="1439997" rtl="0" eaLnBrk="1" latinLnBrk="0" hangingPunct="1">
+      <a:lvl4pPr marL="3150154" indent="-450022" algn="l" defTabSz="1800088" rtl="0" eaLnBrk="1" latinLnBrk="0" hangingPunct="1">
         <a:lnSpc>
           <a:spcPct val="90000"/>
         </a:lnSpc>
         <a:spcBef>
-          <a:spcPts val="787"/>
+          <a:spcPts val="984"/>
         </a:spcBef>
         <a:buFont typeface="Arial" panose="020B0604020202020204" pitchFamily="34" charset="0"/>
         <a:buChar char="•"/>
-        <a:defRPr sz="2835" kern="1200">
+        <a:defRPr sz="3543" kern="1200">
           <a:solidFill>
             <a:schemeClr val="tx1"/>
           </a:solidFill>
@@ -2761,16 +2761,16 @@
           <a:cs typeface="+mn-cs"/>
         </a:defRPr>
       </a:lvl4pPr>
-      <a:lvl5pPr marL="3239994" indent="-359999" algn="l" defTabSz="1439997" rtl="0" eaLnBrk="1" latinLnBrk="0" hangingPunct="1">
+      <a:lvl5pPr marL="4050198" indent="-450022" algn="l" defTabSz="1800088" rtl="0" eaLnBrk="1" latinLnBrk="0" hangingPunct="1">
         <a:lnSpc>
           <a:spcPct val="90000"/>
         </a:lnSpc>
         <a:spcBef>
-          <a:spcPts val="787"/>
+          <a:spcPts val="984"/>
         </a:spcBef>
         <a:buFont typeface="Arial" panose="020B0604020202020204" pitchFamily="34" charset="0"/>
         <a:buChar char="•"/>
-        <a:defRPr sz="2835" kern="1200">
+        <a:defRPr sz="3543" kern="1200">
           <a:solidFill>
             <a:schemeClr val="tx1"/>
           </a:solidFill>
@@ -2779,16 +2779,16 @@
           <a:cs typeface="+mn-cs"/>
         </a:defRPr>
       </a:lvl5pPr>
-      <a:lvl6pPr marL="3959992" indent="-359999" algn="l" defTabSz="1439997" rtl="0" eaLnBrk="1" latinLnBrk="0" hangingPunct="1">
+      <a:lvl6pPr marL="4950242" indent="-450022" algn="l" defTabSz="1800088" rtl="0" eaLnBrk="1" latinLnBrk="0" hangingPunct="1">
         <a:lnSpc>
           <a:spcPct val="90000"/>
         </a:lnSpc>
         <a:spcBef>
-          <a:spcPts val="787"/>
+          <a:spcPts val="984"/>
         </a:spcBef>
         <a:buFont typeface="Arial" panose="020B0604020202020204" pitchFamily="34" charset="0"/>
         <a:buChar char="•"/>
-        <a:defRPr sz="2835" kern="1200">
+        <a:defRPr sz="3543" kern="1200">
           <a:solidFill>
             <a:schemeClr val="tx1"/>
           </a:solidFill>
@@ -2797,16 +2797,16 @@
           <a:cs typeface="+mn-cs"/>
         </a:defRPr>
       </a:lvl6pPr>
-      <a:lvl7pPr marL="4679991" indent="-359999" algn="l" defTabSz="1439997" rtl="0" eaLnBrk="1" latinLnBrk="0" hangingPunct="1">
+      <a:lvl7pPr marL="5850285" indent="-450022" algn="l" defTabSz="1800088" rtl="0" eaLnBrk="1" latinLnBrk="0" hangingPunct="1">
         <a:lnSpc>
           <a:spcPct val="90000"/>
         </a:lnSpc>
         <a:spcBef>
-          <a:spcPts val="787"/>
+          <a:spcPts val="984"/>
         </a:spcBef>
         <a:buFont typeface="Arial" panose="020B0604020202020204" pitchFamily="34" charset="0"/>
         <a:buChar char="•"/>
-        <a:defRPr sz="2835" kern="1200">
+        <a:defRPr sz="3543" kern="1200">
           <a:solidFill>
             <a:schemeClr val="tx1"/>
           </a:solidFill>
@@ -2815,16 +2815,16 @@
           <a:cs typeface="+mn-cs"/>
         </a:defRPr>
       </a:lvl7pPr>
-      <a:lvl8pPr marL="5399989" indent="-359999" algn="l" defTabSz="1439997" rtl="0" eaLnBrk="1" latinLnBrk="0" hangingPunct="1">
+      <a:lvl8pPr marL="6750329" indent="-450022" algn="l" defTabSz="1800088" rtl="0" eaLnBrk="1" latinLnBrk="0" hangingPunct="1">
         <a:lnSpc>
           <a:spcPct val="90000"/>
         </a:lnSpc>
         <a:spcBef>
-          <a:spcPts val="787"/>
+          <a:spcPts val="984"/>
         </a:spcBef>
         <a:buFont typeface="Arial" panose="020B0604020202020204" pitchFamily="34" charset="0"/>
         <a:buChar char="•"/>
-        <a:defRPr sz="2835" kern="1200">
+        <a:defRPr sz="3543" kern="1200">
           <a:solidFill>
             <a:schemeClr val="tx1"/>
           </a:solidFill>
@@ -2833,16 +2833,16 @@
           <a:cs typeface="+mn-cs"/>
         </a:defRPr>
       </a:lvl8pPr>
-      <a:lvl9pPr marL="6119988" indent="-359999" algn="l" defTabSz="1439997" rtl="0" eaLnBrk="1" latinLnBrk="0" hangingPunct="1">
+      <a:lvl9pPr marL="7650373" indent="-450022" algn="l" defTabSz="1800088" rtl="0" eaLnBrk="1" latinLnBrk="0" hangingPunct="1">
         <a:lnSpc>
           <a:spcPct val="90000"/>
         </a:lnSpc>
         <a:spcBef>
-          <a:spcPts val="787"/>
+          <a:spcPts val="984"/>
         </a:spcBef>
         <a:buFont typeface="Arial" panose="020B0604020202020204" pitchFamily="34" charset="0"/>
         <a:buChar char="•"/>
-        <a:defRPr sz="2835" kern="1200">
+        <a:defRPr sz="3543" kern="1200">
           <a:solidFill>
             <a:schemeClr val="tx1"/>
           </a:solidFill>
@@ -2856,8 +2856,8 @@
       <a:defPPr>
         <a:defRPr lang="en-US"/>
       </a:defPPr>
-      <a:lvl1pPr marL="0" algn="l" defTabSz="1439997" rtl="0" eaLnBrk="1" latinLnBrk="0" hangingPunct="1">
-        <a:defRPr sz="2835" kern="1200">
+      <a:lvl1pPr marL="0" algn="l" defTabSz="1800088" rtl="0" eaLnBrk="1" latinLnBrk="0" hangingPunct="1">
+        <a:defRPr sz="3543" kern="1200">
           <a:solidFill>
             <a:schemeClr val="tx1"/>
           </a:solidFill>
@@ -2866,8 +2866,8 @@
           <a:cs typeface="+mn-cs"/>
         </a:defRPr>
       </a:lvl1pPr>
-      <a:lvl2pPr marL="719999" algn="l" defTabSz="1439997" rtl="0" eaLnBrk="1" latinLnBrk="0" hangingPunct="1">
-        <a:defRPr sz="2835" kern="1200">
+      <a:lvl2pPr marL="900044" algn="l" defTabSz="1800088" rtl="0" eaLnBrk="1" latinLnBrk="0" hangingPunct="1">
+        <a:defRPr sz="3543" kern="1200">
           <a:solidFill>
             <a:schemeClr val="tx1"/>
           </a:solidFill>
@@ -2876,8 +2876,8 @@
           <a:cs typeface="+mn-cs"/>
         </a:defRPr>
       </a:lvl2pPr>
-      <a:lvl3pPr marL="1439997" algn="l" defTabSz="1439997" rtl="0" eaLnBrk="1" latinLnBrk="0" hangingPunct="1">
-        <a:defRPr sz="2835" kern="1200">
+      <a:lvl3pPr marL="1800088" algn="l" defTabSz="1800088" rtl="0" eaLnBrk="1" latinLnBrk="0" hangingPunct="1">
+        <a:defRPr sz="3543" kern="1200">
           <a:solidFill>
             <a:schemeClr val="tx1"/>
           </a:solidFill>
@@ -2886,8 +2886,8 @@
           <a:cs typeface="+mn-cs"/>
         </a:defRPr>
       </a:lvl3pPr>
-      <a:lvl4pPr marL="2159996" algn="l" defTabSz="1439997" rtl="0" eaLnBrk="1" latinLnBrk="0" hangingPunct="1">
-        <a:defRPr sz="2835" kern="1200">
+      <a:lvl4pPr marL="2700132" algn="l" defTabSz="1800088" rtl="0" eaLnBrk="1" latinLnBrk="0" hangingPunct="1">
+        <a:defRPr sz="3543" kern="1200">
           <a:solidFill>
             <a:schemeClr val="tx1"/>
           </a:solidFill>
@@ -2896,8 +2896,8 @@
           <a:cs typeface="+mn-cs"/>
         </a:defRPr>
       </a:lvl4pPr>
-      <a:lvl5pPr marL="2879994" algn="l" defTabSz="1439997" rtl="0" eaLnBrk="1" latinLnBrk="0" hangingPunct="1">
-        <a:defRPr sz="2835" kern="1200">
+      <a:lvl5pPr marL="3600176" algn="l" defTabSz="1800088" rtl="0" eaLnBrk="1" latinLnBrk="0" hangingPunct="1">
+        <a:defRPr sz="3543" kern="1200">
           <a:solidFill>
             <a:schemeClr val="tx1"/>
           </a:solidFill>
@@ -2906,8 +2906,8 @@
           <a:cs typeface="+mn-cs"/>
         </a:defRPr>
       </a:lvl5pPr>
-      <a:lvl6pPr marL="3599993" algn="l" defTabSz="1439997" rtl="0" eaLnBrk="1" latinLnBrk="0" hangingPunct="1">
-        <a:defRPr sz="2835" kern="1200">
+      <a:lvl6pPr marL="4500220" algn="l" defTabSz="1800088" rtl="0" eaLnBrk="1" latinLnBrk="0" hangingPunct="1">
+        <a:defRPr sz="3543" kern="1200">
           <a:solidFill>
             <a:schemeClr val="tx1"/>
           </a:solidFill>
@@ -2916,8 +2916,8 @@
           <a:cs typeface="+mn-cs"/>
         </a:defRPr>
       </a:lvl6pPr>
-      <a:lvl7pPr marL="4319991" algn="l" defTabSz="1439997" rtl="0" eaLnBrk="1" latinLnBrk="0" hangingPunct="1">
-        <a:defRPr sz="2835" kern="1200">
+      <a:lvl7pPr marL="5400264" algn="l" defTabSz="1800088" rtl="0" eaLnBrk="1" latinLnBrk="0" hangingPunct="1">
+        <a:defRPr sz="3543" kern="1200">
           <a:solidFill>
             <a:schemeClr val="tx1"/>
           </a:solidFill>
@@ -2926,8 +2926,8 @@
           <a:cs typeface="+mn-cs"/>
         </a:defRPr>
       </a:lvl7pPr>
-      <a:lvl8pPr marL="5039990" algn="l" defTabSz="1439997" rtl="0" eaLnBrk="1" latinLnBrk="0" hangingPunct="1">
-        <a:defRPr sz="2835" kern="1200">
+      <a:lvl8pPr marL="6300307" algn="l" defTabSz="1800088" rtl="0" eaLnBrk="1" latinLnBrk="0" hangingPunct="1">
+        <a:defRPr sz="3543" kern="1200">
           <a:solidFill>
             <a:schemeClr val="tx1"/>
           </a:solidFill>
@@ -2936,8 +2936,8 @@
           <a:cs typeface="+mn-cs"/>
         </a:defRPr>
       </a:lvl8pPr>
-      <a:lvl9pPr marL="5759988" algn="l" defTabSz="1439997" rtl="0" eaLnBrk="1" latinLnBrk="0" hangingPunct="1">
-        <a:defRPr sz="2835" kern="1200">
+      <a:lvl9pPr marL="7200351" algn="l" defTabSz="1800088" rtl="0" eaLnBrk="1" latinLnBrk="0" hangingPunct="1">
+        <a:defRPr sz="3543" kern="1200">
           <a:solidFill>
             <a:schemeClr val="tx1"/>
           </a:solidFill>
@@ -2986,7 +2986,7 @@
         </p:nvCxnSpPr>
         <p:spPr>
           <a:xfrm flipV="1">
-            <a:off x="3108784" y="1739948"/>
+            <a:off x="7131014" y="1601469"/>
             <a:ext cx="1417995" cy="1"/>
           </a:xfrm>
           <a:prstGeom prst="bentConnector3">
@@ -3035,7 +3035,7 @@
         </p:nvCxnSpPr>
         <p:spPr>
           <a:xfrm flipV="1">
-            <a:off x="3108785" y="1975678"/>
+            <a:off x="7131014" y="1837199"/>
             <a:ext cx="1417994" cy="402707"/>
           </a:xfrm>
           <a:prstGeom prst="bentConnector3">
@@ -3080,7 +3080,7 @@
         </p:nvGrpSpPr>
         <p:grpSpPr>
           <a:xfrm>
-            <a:off x="4222296" y="1307778"/>
+            <a:off x="8244525" y="1169298"/>
             <a:ext cx="2131378" cy="785764"/>
             <a:chOff x="3377381" y="100584"/>
             <a:chExt cx="2133600" cy="786583"/>
@@ -3335,7 +3335,7 @@
         </p:nvCxnSpPr>
         <p:spPr>
           <a:xfrm flipV="1">
-            <a:off x="6353674" y="1435209"/>
+            <a:off x="10375903" y="1296730"/>
             <a:ext cx="790176" cy="304739"/>
           </a:xfrm>
           <a:prstGeom prst="bentConnector3">
@@ -3381,7 +3381,7 @@
         </p:nvGrpSpPr>
         <p:grpSpPr>
           <a:xfrm>
-            <a:off x="7143849" y="1317344"/>
+            <a:off x="11166078" y="1178865"/>
             <a:ext cx="2013514" cy="435293"/>
             <a:chOff x="1818966" y="1607578"/>
             <a:chExt cx="2015614" cy="435747"/>
@@ -3531,7 +3531,7 @@
         </p:nvGrpSpPr>
         <p:grpSpPr>
           <a:xfrm>
-            <a:off x="1095270" y="1622084"/>
+            <a:off x="5117499" y="1483604"/>
             <a:ext cx="2013514" cy="429050"/>
             <a:chOff x="1818964" y="496527"/>
             <a:chExt cx="2015614" cy="429497"/>
@@ -3681,7 +3681,7 @@
         </p:nvGrpSpPr>
         <p:grpSpPr>
           <a:xfrm>
-            <a:off x="1095269" y="2260520"/>
+            <a:off x="5117498" y="2122041"/>
             <a:ext cx="2013516" cy="440215"/>
             <a:chOff x="1818963" y="1135628"/>
             <a:chExt cx="2015616" cy="440674"/>
@@ -3831,7 +3831,7 @@
         </p:nvSpPr>
         <p:spPr>
           <a:xfrm>
-            <a:off x="7143849" y="1883103"/>
+            <a:off x="11166079" y="1744624"/>
             <a:ext cx="2013513" cy="235729"/>
           </a:xfrm>
           <a:prstGeom prst="snip1Rect">
@@ -3900,7 +3900,7 @@
         </p:nvCxnSpPr>
         <p:spPr>
           <a:xfrm>
-            <a:off x="6353674" y="1975678"/>
+            <a:off x="10375904" y="1837198"/>
             <a:ext cx="790175" cy="25290"/>
           </a:xfrm>
           <a:prstGeom prst="bentConnector3">
@@ -3950,7 +3950,7 @@
         </p:nvCxnSpPr>
         <p:spPr>
           <a:xfrm>
-            <a:off x="9157363" y="1435209"/>
+            <a:off x="13179592" y="1296730"/>
             <a:ext cx="1487836" cy="1254629"/>
           </a:xfrm>
           <a:prstGeom prst="bentConnector3">
@@ -4001,7 +4001,7 @@
         </p:nvCxnSpPr>
         <p:spPr>
           <a:xfrm>
-            <a:off x="9157363" y="1435209"/>
+            <a:off x="13179592" y="1296730"/>
             <a:ext cx="1487836" cy="319475"/>
           </a:xfrm>
           <a:prstGeom prst="bentConnector3">
@@ -4050,7 +4050,7 @@
         </p:nvCxnSpPr>
         <p:spPr>
           <a:xfrm flipV="1">
-            <a:off x="9157362" y="1994406"/>
+            <a:off x="13179592" y="1855926"/>
             <a:ext cx="1487837" cy="6562"/>
           </a:xfrm>
           <a:prstGeom prst="bentConnector3">
@@ -4095,7 +4095,7 @@
         </p:nvGrpSpPr>
         <p:grpSpPr>
           <a:xfrm>
-            <a:off x="10340716" y="1312628"/>
+            <a:off x="14362945" y="1174148"/>
             <a:ext cx="2131378" cy="799642"/>
             <a:chOff x="8637640" y="105439"/>
             <a:chExt cx="2133600" cy="800476"/>
@@ -4371,7 +4371,7 @@
         </p:nvCxnSpPr>
         <p:spPr>
           <a:xfrm>
-            <a:off x="9157363" y="1435209"/>
+            <a:off x="13179592" y="1296730"/>
             <a:ext cx="1487836" cy="2084787"/>
           </a:xfrm>
           <a:prstGeom prst="bentConnector3">
@@ -4422,7 +4422,7 @@
         </p:nvCxnSpPr>
         <p:spPr>
           <a:xfrm>
-            <a:off x="9157363" y="1435209"/>
+            <a:off x="13179592" y="1296729"/>
             <a:ext cx="1487836" cy="2802548"/>
           </a:xfrm>
           <a:prstGeom prst="bentConnector3">
@@ -4469,7 +4469,7 @@
         </p:nvSpPr>
         <p:spPr>
           <a:xfrm>
-            <a:off x="7143849" y="3365419"/>
+            <a:off x="11166079" y="3226940"/>
             <a:ext cx="2013513" cy="235729"/>
           </a:xfrm>
           <a:prstGeom prst="snip1Rect">
@@ -4515,7 +4515,7 @@
                   <a:schemeClr val="tx1"/>
                 </a:solidFill>
               </a:rPr>
-              <a:t>PAST_STUDY_TIME_UPDATED</a:t>
+              <a:t>PAST_EFFORT_UPDATED</a:t>
             </a:r>
           </a:p>
         </p:txBody>
@@ -4538,7 +4538,7 @@
         </p:nvCxnSpPr>
         <p:spPr>
           <a:xfrm>
-            <a:off x="9157362" y="3483284"/>
+            <a:off x="13179592" y="3344804"/>
             <a:ext cx="1487837" cy="1491976"/>
           </a:xfrm>
           <a:prstGeom prst="bentConnector3">
@@ -4589,7 +4589,7 @@
         </p:nvCxnSpPr>
         <p:spPr>
           <a:xfrm>
-            <a:off x="9157362" y="3483284"/>
+            <a:off x="13179592" y="3344805"/>
             <a:ext cx="1487837" cy="2531701"/>
           </a:xfrm>
           <a:prstGeom prst="bentConnector3">
@@ -4634,7 +4634,7 @@
         </p:nvGrpSpPr>
         <p:grpSpPr>
           <a:xfrm>
-            <a:off x="4145871" y="2968782"/>
+            <a:off x="8168100" y="2830303"/>
             <a:ext cx="2207802" cy="784021"/>
             <a:chOff x="3300877" y="102329"/>
             <a:chExt cx="2210104" cy="784838"/>
@@ -4705,7 +4705,7 @@
                   <a:ea typeface="CMU Concrete Roman" panose="02000603000000000000" pitchFamily="2" charset="0"/>
                   <a:cs typeface="CMU Concrete Roman" panose="02000603000000000000" pitchFamily="2" charset="0"/>
                 </a:rPr>
-                <a:t>PastStudyTimeProviderManager</a:t>
+                <a:t>PastEffortProviderManager</a:t>
               </a:r>
               <a:endParaRPr lang="en-US" sz="1099" dirty="0">
                 <a:solidFill>
@@ -4889,7 +4889,7 @@
         </p:nvCxnSpPr>
         <p:spPr>
           <a:xfrm>
-            <a:off x="6353674" y="3399209"/>
+            <a:off x="10375904" y="3260730"/>
             <a:ext cx="790175" cy="84075"/>
           </a:xfrm>
           <a:prstGeom prst="bentConnector3">
@@ -4939,7 +4939,7 @@
         </p:nvCxnSpPr>
         <p:spPr>
           <a:xfrm flipV="1">
-            <a:off x="6353674" y="3483284"/>
+            <a:off x="10375904" y="3344805"/>
             <a:ext cx="790175" cy="151655"/>
           </a:xfrm>
           <a:prstGeom prst="bentConnector3">
@@ -4985,7 +4985,7 @@
         </p:nvSpPr>
         <p:spPr>
           <a:xfrm>
-            <a:off x="7025984" y="5059466"/>
+            <a:off x="11048214" y="4920987"/>
             <a:ext cx="2131377" cy="235729"/>
           </a:xfrm>
           <a:prstGeom prst="snip1Rect">
@@ -5050,7 +5050,7 @@
         </p:nvGrpSpPr>
         <p:grpSpPr>
           <a:xfrm>
-            <a:off x="1090362" y="2966103"/>
+            <a:off x="5112591" y="2827624"/>
             <a:ext cx="2013504" cy="445115"/>
             <a:chOff x="1818964" y="496527"/>
             <a:chExt cx="2133601" cy="445579"/>
@@ -5206,7 +5206,7 @@
         </p:nvCxnSpPr>
         <p:spPr>
           <a:xfrm>
-            <a:off x="3103866" y="3083968"/>
+            <a:off x="7126096" y="2945489"/>
             <a:ext cx="1422913" cy="315241"/>
           </a:xfrm>
           <a:prstGeom prst="bentConnector3">
@@ -5255,7 +5255,7 @@
         </p:nvCxnSpPr>
         <p:spPr>
           <a:xfrm flipH="1" flipV="1">
-            <a:off x="5440227" y="3752803"/>
+            <a:off x="9462456" y="3614323"/>
             <a:ext cx="3717134" cy="1424528"/>
           </a:xfrm>
           <a:prstGeom prst="bentConnector4">
@@ -5305,7 +5305,7 @@
         </p:nvCxnSpPr>
         <p:spPr>
           <a:xfrm>
-            <a:off x="3103866" y="3083968"/>
+            <a:off x="7126096" y="2945489"/>
             <a:ext cx="1422913" cy="1855891"/>
           </a:xfrm>
           <a:prstGeom prst="bentConnector3">
@@ -5350,10 +5350,10 @@
         </p:nvGrpSpPr>
         <p:grpSpPr>
           <a:xfrm>
-            <a:off x="1095267" y="4444733"/>
-            <a:ext cx="2013516" cy="440215"/>
-            <a:chOff x="1818963" y="1135628"/>
-            <a:chExt cx="2015616" cy="440674"/>
+            <a:off x="5113867" y="4306253"/>
+            <a:ext cx="2017146" cy="431337"/>
+            <a:chOff x="1815330" y="1135628"/>
+            <a:chExt cx="2019250" cy="431787"/>
           </a:xfrm>
         </p:grpSpPr>
         <p:sp>
@@ -5370,12 +5370,137 @@
           </p:nvSpPr>
           <p:spPr>
             <a:xfrm>
-              <a:off x="1818966" y="1135628"/>
-              <a:ext cx="2015613" cy="235975"/>
+              <a:off x="1815330" y="1135628"/>
+              <a:ext cx="2019250" cy="235975"/>
             </a:xfrm>
-            <a:prstGeom prst="snip1Rect">
+            <a:custGeom>
               <a:avLst/>
-            </a:prstGeom>
+              <a:gdLst>
+                <a:gd name="connsiteX0" fmla="*/ 0 w 2013513"/>
+                <a:gd name="connsiteY0" fmla="*/ 0 h 235729"/>
+                <a:gd name="connsiteX1" fmla="*/ 1974224 w 2013513"/>
+                <a:gd name="connsiteY1" fmla="*/ 0 h 235729"/>
+                <a:gd name="connsiteX2" fmla="*/ 2013513 w 2013513"/>
+                <a:gd name="connsiteY2" fmla="*/ 39289 h 235729"/>
+                <a:gd name="connsiteX3" fmla="*/ 2013513 w 2013513"/>
+                <a:gd name="connsiteY3" fmla="*/ 235729 h 235729"/>
+                <a:gd name="connsiteX4" fmla="*/ 0 w 2013513"/>
+                <a:gd name="connsiteY4" fmla="*/ 235729 h 235729"/>
+                <a:gd name="connsiteX5" fmla="*/ 0 w 2013513"/>
+                <a:gd name="connsiteY5" fmla="*/ 0 h 235729"/>
+                <a:gd name="connsiteX0" fmla="*/ 0 w 2013513"/>
+                <a:gd name="connsiteY0" fmla="*/ 0 h 235729"/>
+                <a:gd name="connsiteX1" fmla="*/ 1974224 w 2013513"/>
+                <a:gd name="connsiteY1" fmla="*/ 0 h 235729"/>
+                <a:gd name="connsiteX2" fmla="*/ 2013513 w 2013513"/>
+                <a:gd name="connsiteY2" fmla="*/ 39289 h 235729"/>
+                <a:gd name="connsiteX3" fmla="*/ 2009880 w 2013513"/>
+                <a:gd name="connsiteY3" fmla="*/ 89168 h 235729"/>
+                <a:gd name="connsiteX4" fmla="*/ 2013513 w 2013513"/>
+                <a:gd name="connsiteY4" fmla="*/ 235729 h 235729"/>
+                <a:gd name="connsiteX5" fmla="*/ 0 w 2013513"/>
+                <a:gd name="connsiteY5" fmla="*/ 235729 h 235729"/>
+                <a:gd name="connsiteX6" fmla="*/ 0 w 2013513"/>
+                <a:gd name="connsiteY6" fmla="*/ 0 h 235729"/>
+                <a:gd name="connsiteX0" fmla="*/ 0 w 2013513"/>
+                <a:gd name="connsiteY0" fmla="*/ 0 h 235729"/>
+                <a:gd name="connsiteX1" fmla="*/ 1974224 w 2013513"/>
+                <a:gd name="connsiteY1" fmla="*/ 0 h 235729"/>
+                <a:gd name="connsiteX2" fmla="*/ 2013513 w 2013513"/>
+                <a:gd name="connsiteY2" fmla="*/ 39289 h 235729"/>
+                <a:gd name="connsiteX3" fmla="*/ 2009880 w 2013513"/>
+                <a:gd name="connsiteY3" fmla="*/ 89168 h 235729"/>
+                <a:gd name="connsiteX4" fmla="*/ 2009880 w 2013513"/>
+                <a:gd name="connsiteY4" fmla="*/ 193943 h 235729"/>
+                <a:gd name="connsiteX5" fmla="*/ 2013513 w 2013513"/>
+                <a:gd name="connsiteY5" fmla="*/ 235729 h 235729"/>
+                <a:gd name="connsiteX6" fmla="*/ 0 w 2013513"/>
+                <a:gd name="connsiteY6" fmla="*/ 235729 h 235729"/>
+                <a:gd name="connsiteX7" fmla="*/ 0 w 2013513"/>
+                <a:gd name="connsiteY7" fmla="*/ 0 h 235729"/>
+                <a:gd name="connsiteX0" fmla="*/ 3633 w 2017146"/>
+                <a:gd name="connsiteY0" fmla="*/ 0 h 235729"/>
+                <a:gd name="connsiteX1" fmla="*/ 1977857 w 2017146"/>
+                <a:gd name="connsiteY1" fmla="*/ 0 h 235729"/>
+                <a:gd name="connsiteX2" fmla="*/ 2017146 w 2017146"/>
+                <a:gd name="connsiteY2" fmla="*/ 39289 h 235729"/>
+                <a:gd name="connsiteX3" fmla="*/ 2013513 w 2017146"/>
+                <a:gd name="connsiteY3" fmla="*/ 89168 h 235729"/>
+                <a:gd name="connsiteX4" fmla="*/ 2013513 w 2017146"/>
+                <a:gd name="connsiteY4" fmla="*/ 193943 h 235729"/>
+                <a:gd name="connsiteX5" fmla="*/ 2017146 w 2017146"/>
+                <a:gd name="connsiteY5" fmla="*/ 235729 h 235729"/>
+                <a:gd name="connsiteX6" fmla="*/ 3633 w 2017146"/>
+                <a:gd name="connsiteY6" fmla="*/ 235729 h 235729"/>
+                <a:gd name="connsiteX7" fmla="*/ 0 w 2017146"/>
+                <a:gd name="connsiteY7" fmla="*/ 118991 h 235729"/>
+                <a:gd name="connsiteX8" fmla="*/ 3633 w 2017146"/>
+                <a:gd name="connsiteY8" fmla="*/ 0 h 235729"/>
+              </a:gdLst>
+              <a:ahLst/>
+              <a:cxnLst>
+                <a:cxn ang="0">
+                  <a:pos x="connsiteX0" y="connsiteY0"/>
+                </a:cxn>
+                <a:cxn ang="0">
+                  <a:pos x="connsiteX1" y="connsiteY1"/>
+                </a:cxn>
+                <a:cxn ang="0">
+                  <a:pos x="connsiteX2" y="connsiteY2"/>
+                </a:cxn>
+                <a:cxn ang="0">
+                  <a:pos x="connsiteX3" y="connsiteY3"/>
+                </a:cxn>
+                <a:cxn ang="0">
+                  <a:pos x="connsiteX4" y="connsiteY4"/>
+                </a:cxn>
+                <a:cxn ang="0">
+                  <a:pos x="connsiteX5" y="connsiteY5"/>
+                </a:cxn>
+                <a:cxn ang="0">
+                  <a:pos x="connsiteX6" y="connsiteY6"/>
+                </a:cxn>
+                <a:cxn ang="0">
+                  <a:pos x="connsiteX7" y="connsiteY7"/>
+                </a:cxn>
+                <a:cxn ang="0">
+                  <a:pos x="connsiteX8" y="connsiteY8"/>
+                </a:cxn>
+              </a:cxnLst>
+              <a:rect l="l" t="t" r="r" b="b"/>
+              <a:pathLst>
+                <a:path w="2017146" h="235729">
+                  <a:moveTo>
+                    <a:pt x="3633" y="0"/>
+                  </a:moveTo>
+                  <a:lnTo>
+                    <a:pt x="1977857" y="0"/>
+                  </a:lnTo>
+                  <a:lnTo>
+                    <a:pt x="2017146" y="39289"/>
+                  </a:lnTo>
+                  <a:lnTo>
+                    <a:pt x="2013513" y="89168"/>
+                  </a:lnTo>
+                  <a:lnTo>
+                    <a:pt x="2013513" y="193943"/>
+                  </a:lnTo>
+                  <a:lnTo>
+                    <a:pt x="2017146" y="235729"/>
+                  </a:lnTo>
+                  <a:lnTo>
+                    <a:pt x="3633" y="235729"/>
+                  </a:lnTo>
+                  <a:lnTo>
+                    <a:pt x="0" y="118991"/>
+                  </a:lnTo>
+                  <a:lnTo>
+                    <a:pt x="3633" y="0"/>
+                  </a:lnTo>
+                  <a:close/>
+                </a:path>
+              </a:pathLst>
+            </a:custGeom>
             <a:solidFill>
               <a:schemeClr val="bg1">
                 <a:lumMod val="95000"/>
@@ -5435,7 +5560,7 @@
           </p:nvSpPr>
           <p:spPr>
             <a:xfrm>
-              <a:off x="1818963" y="1393068"/>
+              <a:off x="1818963" y="1384181"/>
               <a:ext cx="2015613" cy="183234"/>
             </a:xfrm>
             <a:prstGeom prst="rect">
@@ -5500,10 +5625,10 @@
         </p:nvGrpSpPr>
         <p:grpSpPr>
           <a:xfrm>
-            <a:off x="1090356" y="5061114"/>
-            <a:ext cx="2013516" cy="430165"/>
-            <a:chOff x="1818963" y="1135628"/>
-            <a:chExt cx="2015616" cy="430614"/>
+            <a:off x="5108221" y="4922635"/>
+            <a:ext cx="2017879" cy="430165"/>
+            <a:chOff x="1814595" y="1135628"/>
+            <a:chExt cx="2019984" cy="430614"/>
           </a:xfrm>
         </p:grpSpPr>
         <p:sp>
@@ -5520,12 +5645,145 @@
           </p:nvSpPr>
           <p:spPr>
             <a:xfrm>
-              <a:off x="1818966" y="1135628"/>
-              <a:ext cx="2015613" cy="235975"/>
+              <a:off x="1814595" y="1135628"/>
+              <a:ext cx="2019984" cy="235975"/>
             </a:xfrm>
-            <a:prstGeom prst="snip1Rect">
+            <a:custGeom>
               <a:avLst/>
-            </a:prstGeom>
+              <a:gdLst>
+                <a:gd name="connsiteX0" fmla="*/ 0 w 2013513"/>
+                <a:gd name="connsiteY0" fmla="*/ 0 h 235729"/>
+                <a:gd name="connsiteX1" fmla="*/ 1974224 w 2013513"/>
+                <a:gd name="connsiteY1" fmla="*/ 0 h 235729"/>
+                <a:gd name="connsiteX2" fmla="*/ 2013513 w 2013513"/>
+                <a:gd name="connsiteY2" fmla="*/ 39289 h 235729"/>
+                <a:gd name="connsiteX3" fmla="*/ 2013513 w 2013513"/>
+                <a:gd name="connsiteY3" fmla="*/ 235729 h 235729"/>
+                <a:gd name="connsiteX4" fmla="*/ 0 w 2013513"/>
+                <a:gd name="connsiteY4" fmla="*/ 235729 h 235729"/>
+                <a:gd name="connsiteX5" fmla="*/ 0 w 2013513"/>
+                <a:gd name="connsiteY5" fmla="*/ 0 h 235729"/>
+                <a:gd name="connsiteX0" fmla="*/ 0 w 2013513"/>
+                <a:gd name="connsiteY0" fmla="*/ 0 h 235729"/>
+                <a:gd name="connsiteX1" fmla="*/ 1974224 w 2013513"/>
+                <a:gd name="connsiteY1" fmla="*/ 0 h 235729"/>
+                <a:gd name="connsiteX2" fmla="*/ 2013513 w 2013513"/>
+                <a:gd name="connsiteY2" fmla="*/ 39289 h 235729"/>
+                <a:gd name="connsiteX3" fmla="*/ 2012479 w 2013513"/>
+                <a:gd name="connsiteY3" fmla="*/ 84777 h 235729"/>
+                <a:gd name="connsiteX4" fmla="*/ 2013513 w 2013513"/>
+                <a:gd name="connsiteY4" fmla="*/ 235729 h 235729"/>
+                <a:gd name="connsiteX5" fmla="*/ 0 w 2013513"/>
+                <a:gd name="connsiteY5" fmla="*/ 235729 h 235729"/>
+                <a:gd name="connsiteX6" fmla="*/ 0 w 2013513"/>
+                <a:gd name="connsiteY6" fmla="*/ 0 h 235729"/>
+                <a:gd name="connsiteX0" fmla="*/ 0 w 2013513"/>
+                <a:gd name="connsiteY0" fmla="*/ 0 h 235729"/>
+                <a:gd name="connsiteX1" fmla="*/ 1974224 w 2013513"/>
+                <a:gd name="connsiteY1" fmla="*/ 0 h 235729"/>
+                <a:gd name="connsiteX2" fmla="*/ 2013513 w 2013513"/>
+                <a:gd name="connsiteY2" fmla="*/ 39289 h 235729"/>
+                <a:gd name="connsiteX3" fmla="*/ 2012479 w 2013513"/>
+                <a:gd name="connsiteY3" fmla="*/ 153644 h 235729"/>
+                <a:gd name="connsiteX4" fmla="*/ 2013513 w 2013513"/>
+                <a:gd name="connsiteY4" fmla="*/ 235729 h 235729"/>
+                <a:gd name="connsiteX5" fmla="*/ 0 w 2013513"/>
+                <a:gd name="connsiteY5" fmla="*/ 235729 h 235729"/>
+                <a:gd name="connsiteX6" fmla="*/ 0 w 2013513"/>
+                <a:gd name="connsiteY6" fmla="*/ 0 h 235729"/>
+                <a:gd name="connsiteX0" fmla="*/ 0 w 2013513"/>
+                <a:gd name="connsiteY0" fmla="*/ 0 h 235729"/>
+                <a:gd name="connsiteX1" fmla="*/ 1974224 w 2013513"/>
+                <a:gd name="connsiteY1" fmla="*/ 0 h 235729"/>
+                <a:gd name="connsiteX2" fmla="*/ 2013513 w 2013513"/>
+                <a:gd name="connsiteY2" fmla="*/ 39289 h 235729"/>
+                <a:gd name="connsiteX3" fmla="*/ 2012479 w 2013513"/>
+                <a:gd name="connsiteY3" fmla="*/ 115385 h 235729"/>
+                <a:gd name="connsiteX4" fmla="*/ 2013513 w 2013513"/>
+                <a:gd name="connsiteY4" fmla="*/ 235729 h 235729"/>
+                <a:gd name="connsiteX5" fmla="*/ 0 w 2013513"/>
+                <a:gd name="connsiteY5" fmla="*/ 235729 h 235729"/>
+                <a:gd name="connsiteX6" fmla="*/ 0 w 2013513"/>
+                <a:gd name="connsiteY6" fmla="*/ 0 h 235729"/>
+                <a:gd name="connsiteX0" fmla="*/ 4366 w 2017879"/>
+                <a:gd name="connsiteY0" fmla="*/ 0 h 235729"/>
+                <a:gd name="connsiteX1" fmla="*/ 1978590 w 2017879"/>
+                <a:gd name="connsiteY1" fmla="*/ 0 h 235729"/>
+                <a:gd name="connsiteX2" fmla="*/ 2017879 w 2017879"/>
+                <a:gd name="connsiteY2" fmla="*/ 39289 h 235729"/>
+                <a:gd name="connsiteX3" fmla="*/ 2016845 w 2017879"/>
+                <a:gd name="connsiteY3" fmla="*/ 115385 h 235729"/>
+                <a:gd name="connsiteX4" fmla="*/ 2017879 w 2017879"/>
+                <a:gd name="connsiteY4" fmla="*/ 235729 h 235729"/>
+                <a:gd name="connsiteX5" fmla="*/ 4366 w 2017879"/>
+                <a:gd name="connsiteY5" fmla="*/ 235729 h 235729"/>
+                <a:gd name="connsiteX6" fmla="*/ 0 w 2017879"/>
+                <a:gd name="connsiteY6" fmla="*/ 112209 h 235729"/>
+                <a:gd name="connsiteX7" fmla="*/ 4366 w 2017879"/>
+                <a:gd name="connsiteY7" fmla="*/ 0 h 235729"/>
+              </a:gdLst>
+              <a:ahLst/>
+              <a:cxnLst>
+                <a:cxn ang="0">
+                  <a:pos x="connsiteX0" y="connsiteY0"/>
+                </a:cxn>
+                <a:cxn ang="0">
+                  <a:pos x="connsiteX1" y="connsiteY1"/>
+                </a:cxn>
+                <a:cxn ang="0">
+                  <a:pos x="connsiteX2" y="connsiteY2"/>
+                </a:cxn>
+                <a:cxn ang="0">
+                  <a:pos x="connsiteX3" y="connsiteY3"/>
+                </a:cxn>
+                <a:cxn ang="0">
+                  <a:pos x="connsiteX4" y="connsiteY4"/>
+                </a:cxn>
+                <a:cxn ang="0">
+                  <a:pos x="connsiteX5" y="connsiteY5"/>
+                </a:cxn>
+                <a:cxn ang="0">
+                  <a:pos x="connsiteX6" y="connsiteY6"/>
+                </a:cxn>
+                <a:cxn ang="0">
+                  <a:pos x="connsiteX7" y="connsiteY7"/>
+                </a:cxn>
+              </a:cxnLst>
+              <a:rect l="l" t="t" r="r" b="b"/>
+              <a:pathLst>
+                <a:path w="2017879" h="235729">
+                  <a:moveTo>
+                    <a:pt x="4366" y="0"/>
+                  </a:moveTo>
+                  <a:lnTo>
+                    <a:pt x="1978590" y="0"/>
+                  </a:lnTo>
+                  <a:lnTo>
+                    <a:pt x="2017879" y="39289"/>
+                  </a:lnTo>
+                  <a:cubicBezTo>
+                    <a:pt x="2017534" y="54452"/>
+                    <a:pt x="2017190" y="100222"/>
+                    <a:pt x="2016845" y="115385"/>
+                  </a:cubicBezTo>
+                  <a:cubicBezTo>
+                    <a:pt x="2017190" y="165702"/>
+                    <a:pt x="2017534" y="185412"/>
+                    <a:pt x="2017879" y="235729"/>
+                  </a:cubicBezTo>
+                  <a:lnTo>
+                    <a:pt x="4366" y="235729"/>
+                  </a:lnTo>
+                  <a:lnTo>
+                    <a:pt x="0" y="112209"/>
+                  </a:lnTo>
+                  <a:lnTo>
+                    <a:pt x="4366" y="0"/>
+                  </a:lnTo>
+                  <a:close/>
+                </a:path>
+              </a:pathLst>
+            </a:custGeom>
             <a:solidFill>
               <a:schemeClr val="bg1">
                 <a:lumMod val="95000"/>
@@ -5650,7 +5908,7 @@
         </p:nvGrpSpPr>
         <p:grpSpPr>
           <a:xfrm>
-            <a:off x="1090356" y="5570960"/>
+            <a:off x="5106296" y="6045254"/>
             <a:ext cx="2013516" cy="430167"/>
             <a:chOff x="1818963" y="1135628"/>
             <a:chExt cx="2015616" cy="430616"/>
@@ -5800,7 +6058,7 @@
         </p:nvGrpSpPr>
         <p:grpSpPr>
           <a:xfrm>
-            <a:off x="1090353" y="6134074"/>
+            <a:off x="5106296" y="5532873"/>
             <a:ext cx="2013516" cy="430167"/>
             <a:chOff x="1818963" y="1135628"/>
             <a:chExt cx="2015616" cy="430616"/>
@@ -5950,10 +6208,10 @@
         </p:nvGrpSpPr>
         <p:grpSpPr>
           <a:xfrm>
-            <a:off x="1090353" y="6697190"/>
-            <a:ext cx="2013516" cy="440215"/>
+            <a:off x="5113226" y="6590489"/>
+            <a:ext cx="2013516" cy="428927"/>
             <a:chOff x="1818963" y="1135628"/>
-            <a:chExt cx="2015616" cy="440674"/>
+            <a:chExt cx="2015616" cy="429374"/>
           </a:xfrm>
         </p:grpSpPr>
         <p:sp>
@@ -6035,7 +6293,7 @@
           </p:nvSpPr>
           <p:spPr>
             <a:xfrm>
-              <a:off x="1818963" y="1393068"/>
+              <a:off x="1818963" y="1381768"/>
               <a:ext cx="2015613" cy="183234"/>
             </a:xfrm>
             <a:prstGeom prst="rect">
@@ -6088,55 +6346,6 @@
       </p:grpSp>
       <p:cxnSp>
         <p:nvCxnSpPr>
-          <p:cNvPr id="163" name="Straight Arrow Connector 9">
-            <a:extLst>
-              <a:ext uri="{FF2B5EF4-FFF2-40B4-BE49-F238E27FC236}">
-                <a16:creationId xmlns:a16="http://schemas.microsoft.com/office/drawing/2014/main" id="{FE3C77DE-05F7-616D-5CD0-56A455D2143D}"/>
-              </a:ext>
-            </a:extLst>
-          </p:cNvPr>
-          <p:cNvCxnSpPr>
-            <a:cxnSpLocks/>
-            <a:stCxn id="149" idx="0"/>
-            <a:endCxn id="141" idx="1"/>
-          </p:cNvCxnSpPr>
-          <p:nvPr/>
-        </p:nvCxnSpPr>
-        <p:spPr>
-          <a:xfrm>
-            <a:off x="3108783" y="4562598"/>
-            <a:ext cx="1417996" cy="612991"/>
-          </a:xfrm>
-          <a:prstGeom prst="bentConnector3">
-            <a:avLst>
-              <a:gd name="adj1" fmla="val 22515"/>
-            </a:avLst>
-          </a:prstGeom>
-          <a:ln w="9525">
-            <a:solidFill>
-              <a:srgbClr val="FF0000"/>
-            </a:solidFill>
-            <a:prstDash val="solid"/>
-            <a:tailEnd type="triangle"/>
-          </a:ln>
-        </p:spPr>
-        <p:style>
-          <a:lnRef idx="2">
-            <a:schemeClr val="accent1"/>
-          </a:lnRef>
-          <a:fillRef idx="0">
-            <a:schemeClr val="accent1"/>
-          </a:fillRef>
-          <a:effectRef idx="1">
-            <a:schemeClr val="accent1"/>
-          </a:effectRef>
-          <a:fontRef idx="minor">
-            <a:schemeClr val="tx1"/>
-          </a:fontRef>
-        </p:style>
-      </p:cxnSp>
-      <p:cxnSp>
-        <p:nvCxnSpPr>
           <p:cNvPr id="167" name="Straight Arrow Connector 9">
             <a:extLst>
               <a:ext uri="{FF2B5EF4-FFF2-40B4-BE49-F238E27FC236}">
@@ -6146,15 +6355,15 @@
           </p:cNvPr>
           <p:cNvCxnSpPr>
             <a:cxnSpLocks/>
-            <a:stCxn id="152" idx="0"/>
+            <a:stCxn id="152" idx="3"/>
             <a:endCxn id="141" idx="1"/>
           </p:cNvCxnSpPr>
           <p:nvPr/>
         </p:nvCxnSpPr>
         <p:spPr>
           <a:xfrm flipV="1">
-            <a:off x="3103872" y="5175589"/>
-            <a:ext cx="1422907" cy="3390"/>
+            <a:off x="7125066" y="5037110"/>
+            <a:ext cx="1423942" cy="910"/>
           </a:xfrm>
           <a:prstGeom prst="straightConnector1">
             <a:avLst/>
@@ -6200,12 +6409,12 @@
         </p:nvCxnSpPr>
         <p:spPr>
           <a:xfrm flipV="1">
-            <a:off x="3103872" y="5411318"/>
-            <a:ext cx="1422907" cy="277508"/>
+            <a:off x="7119812" y="5272839"/>
+            <a:ext cx="1429196" cy="890280"/>
           </a:xfrm>
           <a:prstGeom prst="bentConnector3">
             <a:avLst>
-              <a:gd name="adj1" fmla="val 34464"/>
+              <a:gd name="adj1" fmla="val 44852"/>
             </a:avLst>
           </a:prstGeom>
           <a:ln w="9525">
@@ -6249,12 +6458,12 @@
         </p:nvCxnSpPr>
         <p:spPr>
           <a:xfrm flipV="1">
-            <a:off x="3103869" y="5411318"/>
-            <a:ext cx="1422910" cy="840622"/>
+            <a:off x="7119812" y="5272839"/>
+            <a:ext cx="1429196" cy="377899"/>
           </a:xfrm>
           <a:prstGeom prst="bentConnector3">
             <a:avLst>
-              <a:gd name="adj1" fmla="val 42232"/>
+              <a:gd name="adj1" fmla="val 38234"/>
             </a:avLst>
           </a:prstGeom>
           <a:ln w="9525">
@@ -6294,7 +6503,7 @@
         </p:nvGrpSpPr>
         <p:grpSpPr>
           <a:xfrm>
-            <a:off x="4222296" y="4507689"/>
+            <a:off x="8244525" y="4369210"/>
             <a:ext cx="2131378" cy="1256229"/>
             <a:chOff x="3878827" y="3303830"/>
             <a:chExt cx="2133600" cy="1257539"/>
@@ -6690,7 +6899,7 @@
                   <a:ea typeface="CMU Concrete Roman" panose="02000603000000000000" pitchFamily="2" charset="0"/>
                   <a:cs typeface="CMU Concrete Roman" panose="02000603000000000000" pitchFamily="2" charset="0"/>
                 </a:rPr>
-                <a:t>liveSession = null ;</a:t>
+                <a:t>currentSession = null ;</a:t>
               </a:r>
               <a:endParaRPr lang="en-US" sz="999" dirty="0">
                 <a:solidFill>
@@ -6704,55 +6913,6 @@
           </p:txBody>
         </p:sp>
       </p:grpSp>
-      <p:cxnSp>
-        <p:nvCxnSpPr>
-          <p:cNvPr id="183" name="Straight Arrow Connector 9">
-            <a:extLst>
-              <a:ext uri="{FF2B5EF4-FFF2-40B4-BE49-F238E27FC236}">
-                <a16:creationId xmlns:a16="http://schemas.microsoft.com/office/drawing/2014/main" id="{B540E9FD-1272-4ECC-A1F6-8B3BF4F39083}"/>
-              </a:ext>
-            </a:extLst>
-          </p:cNvPr>
-          <p:cNvCxnSpPr>
-            <a:cxnSpLocks/>
-            <a:stCxn id="161" idx="0"/>
-            <a:endCxn id="181" idx="1"/>
-          </p:cNvCxnSpPr>
-          <p:nvPr/>
-        </p:nvCxnSpPr>
-        <p:spPr>
-          <a:xfrm flipV="1">
-            <a:off x="3103869" y="5646054"/>
-            <a:ext cx="1422910" cy="1169001"/>
-          </a:xfrm>
-          <a:prstGeom prst="bentConnector3">
-            <a:avLst>
-              <a:gd name="adj1" fmla="val 50000"/>
-            </a:avLst>
-          </a:prstGeom>
-          <a:ln w="9525">
-            <a:solidFill>
-              <a:srgbClr val="FF0000"/>
-            </a:solidFill>
-            <a:prstDash val="solid"/>
-            <a:tailEnd type="triangle"/>
-          </a:ln>
-        </p:spPr>
-        <p:style>
-          <a:lnRef idx="2">
-            <a:schemeClr val="accent1"/>
-          </a:lnRef>
-          <a:fillRef idx="0">
-            <a:schemeClr val="accent1"/>
-          </a:fillRef>
-          <a:effectRef idx="1">
-            <a:schemeClr val="accent1"/>
-          </a:effectRef>
-          <a:fontRef idx="minor">
-            <a:schemeClr val="tx1"/>
-          </a:fontRef>
-        </p:style>
-      </p:cxnSp>
       <p:sp>
         <p:nvSpPr>
           <p:cNvPr id="192" name="Snip Single Corner of Rectangle 191">
@@ -6767,7 +6927,7 @@
         </p:nvSpPr>
         <p:spPr>
           <a:xfrm>
-            <a:off x="7025983" y="4501553"/>
+            <a:off x="11048212" y="4363074"/>
             <a:ext cx="2131378" cy="235729"/>
           </a:xfrm>
           <a:prstGeom prst="snip1Rect">
@@ -6836,7 +6996,7 @@
         </p:nvCxnSpPr>
         <p:spPr>
           <a:xfrm flipV="1">
-            <a:off x="6353674" y="4619418"/>
+            <a:off x="10375904" y="4480939"/>
             <a:ext cx="672309" cy="320441"/>
           </a:xfrm>
           <a:prstGeom prst="bentConnector3">
@@ -6886,7 +7046,7 @@
         </p:nvCxnSpPr>
         <p:spPr>
           <a:xfrm>
-            <a:off x="6353674" y="5175589"/>
+            <a:off x="10375903" y="5037109"/>
             <a:ext cx="672310" cy="1742"/>
           </a:xfrm>
           <a:prstGeom prst="bentConnector3">
@@ -6936,7 +7096,7 @@
         </p:nvCxnSpPr>
         <p:spPr>
           <a:xfrm flipV="1">
-            <a:off x="6353674" y="5177331"/>
+            <a:off x="10375903" y="5038852"/>
             <a:ext cx="672310" cy="233987"/>
           </a:xfrm>
           <a:prstGeom prst="bentConnector3">
@@ -6986,7 +7146,7 @@
         </p:nvCxnSpPr>
         <p:spPr>
           <a:xfrm>
-            <a:off x="9157361" y="4619418"/>
+            <a:off x="13179590" y="4480939"/>
             <a:ext cx="1487838" cy="2116787"/>
           </a:xfrm>
           <a:prstGeom prst="bentConnector3">
@@ -7037,7 +7197,7 @@
         </p:nvCxnSpPr>
         <p:spPr>
           <a:xfrm>
-            <a:off x="9157361" y="5177331"/>
+            <a:off x="13179590" y="5038851"/>
             <a:ext cx="1487838" cy="1558874"/>
           </a:xfrm>
           <a:prstGeom prst="bentConnector3">
@@ -7086,7 +7246,7 @@
         </p:nvCxnSpPr>
         <p:spPr>
           <a:xfrm>
-            <a:off x="518790" y="199792"/>
+            <a:off x="2319015" y="199792"/>
             <a:ext cx="576480" cy="0"/>
           </a:xfrm>
           <a:prstGeom prst="straightConnector1">
@@ -7129,7 +7289,7 @@
         </p:nvSpPr>
         <p:spPr>
           <a:xfrm>
-            <a:off x="1095270" y="72342"/>
+            <a:off x="2895495" y="72343"/>
             <a:ext cx="1637882" cy="246221"/>
           </a:xfrm>
           <a:prstGeom prst="rect">
@@ -7166,7 +7326,7 @@
         </p:nvCxnSpPr>
         <p:spPr>
           <a:xfrm>
-            <a:off x="2811109" y="193394"/>
+            <a:off x="4611334" y="193394"/>
             <a:ext cx="576480" cy="0"/>
           </a:xfrm>
           <a:prstGeom prst="straightConnector1">
@@ -7206,7 +7366,7 @@
         </p:nvSpPr>
         <p:spPr>
           <a:xfrm>
-            <a:off x="3410163" y="69358"/>
+            <a:off x="5210388" y="69359"/>
             <a:ext cx="1637882" cy="246221"/>
           </a:xfrm>
           <a:prstGeom prst="rect">
@@ -7243,7 +7403,7 @@
         </p:nvCxnSpPr>
         <p:spPr>
           <a:xfrm>
-            <a:off x="5236519" y="203182"/>
+            <a:off x="7036744" y="203183"/>
             <a:ext cx="800632" cy="831"/>
           </a:xfrm>
           <a:prstGeom prst="straightConnector1">
@@ -7287,7 +7447,7 @@
         </p:nvSpPr>
         <p:spPr>
           <a:xfrm>
-            <a:off x="6037151" y="82602"/>
+            <a:off x="7837376" y="82603"/>
             <a:ext cx="633046" cy="246221"/>
           </a:xfrm>
           <a:prstGeom prst="rect">
@@ -7324,7 +7484,7 @@
         </p:nvCxnSpPr>
         <p:spPr>
           <a:xfrm>
-            <a:off x="518790" y="461983"/>
+            <a:off x="2319015" y="461983"/>
             <a:ext cx="576480" cy="0"/>
           </a:xfrm>
           <a:prstGeom prst="straightConnector1">
@@ -7367,7 +7527,7 @@
         </p:nvSpPr>
         <p:spPr>
           <a:xfrm>
-            <a:off x="1095270" y="334533"/>
+            <a:off x="2895495" y="334534"/>
             <a:ext cx="1637882" cy="246221"/>
           </a:xfrm>
           <a:prstGeom prst="rect">
@@ -7404,7 +7564,7 @@
         </p:nvCxnSpPr>
         <p:spPr>
           <a:xfrm>
-            <a:off x="2811109" y="452859"/>
+            <a:off x="4611334" y="452859"/>
             <a:ext cx="576480" cy="0"/>
           </a:xfrm>
           <a:prstGeom prst="straightConnector1">
@@ -7444,7 +7604,7 @@
         </p:nvSpPr>
         <p:spPr>
           <a:xfrm>
-            <a:off x="3410163" y="328823"/>
+            <a:off x="5210388" y="328824"/>
             <a:ext cx="1637882" cy="246221"/>
           </a:xfrm>
           <a:prstGeom prst="rect">
@@ -7479,7 +7639,7 @@
         </p:nvGrpSpPr>
         <p:grpSpPr>
           <a:xfrm>
-            <a:off x="10340716" y="5578291"/>
+            <a:off x="14362945" y="5439811"/>
             <a:ext cx="2133166" cy="554558"/>
             <a:chOff x="10340716" y="5578291"/>
             <a:chExt cx="2133166" cy="554558"/>
@@ -7570,7 +7730,7 @@
                     <a:ea typeface="CMU Concrete Roman" panose="02000603000000000000" pitchFamily="2" charset="0"/>
                     <a:cs typeface="CMU Concrete Roman" panose="02000603000000000000" pitchFamily="2" charset="0"/>
                   </a:rPr>
-                  <a:t>L60EffortTile</a:t>
+                  <a:t>TotalL60EffortTile</a:t>
                 </a:r>
                 <a:endParaRPr lang="en-US" sz="1099" dirty="0">
                   <a:solidFill>
@@ -7711,7 +7871,7 @@
         </p:nvGrpSpPr>
         <p:grpSpPr>
           <a:xfrm>
-            <a:off x="10340716" y="3087826"/>
+            <a:off x="14362945" y="2949346"/>
             <a:ext cx="2135008" cy="550034"/>
             <a:chOff x="10340716" y="3087826"/>
             <a:chExt cx="2135008" cy="550034"/>
@@ -7943,7 +8103,7 @@
         </p:nvGrpSpPr>
         <p:grpSpPr>
           <a:xfrm>
-            <a:off x="10340716" y="4538566"/>
+            <a:off x="14362946" y="4400086"/>
             <a:ext cx="2133315" cy="554558"/>
             <a:chOff x="10340716" y="4538566"/>
             <a:chExt cx="2133315" cy="554558"/>
@@ -8175,7 +8335,7 @@
         </p:nvGrpSpPr>
         <p:grpSpPr>
           <a:xfrm>
-            <a:off x="10340716" y="3800120"/>
+            <a:off x="14362945" y="3661641"/>
             <a:ext cx="2135732" cy="555501"/>
             <a:chOff x="10340716" y="3800120"/>
             <a:chExt cx="2135732" cy="555501"/>
@@ -8407,7 +8567,7 @@
         </p:nvGrpSpPr>
         <p:grpSpPr>
           <a:xfrm>
-            <a:off x="10340716" y="6299511"/>
+            <a:off x="14362945" y="6161031"/>
             <a:ext cx="2131378" cy="554558"/>
             <a:chOff x="10340716" y="6299511"/>
             <a:chExt cx="2131378" cy="554558"/>
@@ -8639,7 +8799,7 @@
         </p:nvGrpSpPr>
         <p:grpSpPr>
           <a:xfrm>
-            <a:off x="10340716" y="2255406"/>
+            <a:off x="14362945" y="2116926"/>
             <a:ext cx="2133166" cy="552296"/>
             <a:chOff x="10340716" y="2255406"/>
             <a:chExt cx="2133166" cy="552296"/>
@@ -8868,19 +9028,19 @@
           </p:cNvPr>
           <p:cNvCxnSpPr>
             <a:cxnSpLocks/>
-            <a:stCxn id="149" idx="0"/>
+            <a:stCxn id="149" idx="3"/>
             <a:endCxn id="285" idx="1"/>
           </p:cNvCxnSpPr>
           <p:nvPr/>
         </p:nvCxnSpPr>
         <p:spPr>
           <a:xfrm>
-            <a:off x="3108783" y="4562598"/>
-            <a:ext cx="7538204" cy="3011501"/>
+            <a:off x="7127380" y="4395421"/>
+            <a:ext cx="7541837" cy="3040199"/>
           </a:xfrm>
           <a:prstGeom prst="bentConnector3">
             <a:avLst>
-              <a:gd name="adj1" fmla="val 5248"/>
+              <a:gd name="adj1" fmla="val 4950"/>
             </a:avLst>
           </a:prstGeom>
           <a:ln w="9525">
@@ -8919,19 +9079,19 @@
           </p:cNvPr>
           <p:cNvCxnSpPr>
             <a:cxnSpLocks/>
-            <a:stCxn id="152" idx="0"/>
+            <a:stCxn id="152" idx="2"/>
             <a:endCxn id="286" idx="1"/>
           </p:cNvCxnSpPr>
           <p:nvPr/>
         </p:nvCxnSpPr>
         <p:spPr>
           <a:xfrm>
-            <a:off x="3103872" y="5178979"/>
-            <a:ext cx="7543115" cy="2617059"/>
+            <a:off x="7126100" y="4961924"/>
+            <a:ext cx="7543117" cy="2695635"/>
           </a:xfrm>
           <a:prstGeom prst="bentConnector3">
             <a:avLst>
-              <a:gd name="adj1" fmla="val 2923"/>
+              <a:gd name="adj1" fmla="val 2580"/>
             </a:avLst>
           </a:prstGeom>
           <a:ln w="9525">
@@ -8973,7 +9133,7 @@
         </p:nvGrpSpPr>
         <p:grpSpPr>
           <a:xfrm>
-            <a:off x="10342504" y="7128611"/>
+            <a:off x="14364734" y="6990132"/>
             <a:ext cx="2134109" cy="785291"/>
             <a:chOff x="10342504" y="7128611"/>
             <a:chExt cx="2134109" cy="785291"/>
@@ -9288,6 +9448,635 @@
           </p:spPr>
         </p:pic>
       </p:grpSp>
+      <p:grpSp>
+        <p:nvGrpSpPr>
+          <p:cNvPr id="369" name="Group 368">
+            <a:extLst>
+              <a:ext uri="{FF2B5EF4-FFF2-40B4-BE49-F238E27FC236}">
+                <a16:creationId xmlns:a16="http://schemas.microsoft.com/office/drawing/2014/main" id="{992ABC5F-04E3-EFEB-2846-712C47B9137D}"/>
+              </a:ext>
+            </a:extLst>
+          </p:cNvPr>
+          <p:cNvGrpSpPr/>
+          <p:nvPr/>
+        </p:nvGrpSpPr>
+        <p:grpSpPr>
+          <a:xfrm>
+            <a:off x="1367256" y="5220311"/>
+            <a:ext cx="2207802" cy="1261406"/>
+            <a:chOff x="589492" y="5220311"/>
+            <a:chExt cx="2207802" cy="1261406"/>
+          </a:xfrm>
+        </p:grpSpPr>
+        <p:sp>
+          <p:nvSpPr>
+            <p:cNvPr id="324" name="Rectangle 323">
+              <a:extLst>
+                <a:ext uri="{FF2B5EF4-FFF2-40B4-BE49-F238E27FC236}">
+                  <a16:creationId xmlns:a16="http://schemas.microsoft.com/office/drawing/2014/main" id="{F004968B-0A3B-8BD6-1564-386A6908ACD6}"/>
+                </a:ext>
+              </a:extLst>
+            </p:cNvPr>
+            <p:cNvSpPr/>
+            <p:nvPr/>
+          </p:nvSpPr>
+          <p:spPr>
+            <a:xfrm>
+              <a:off x="589492" y="5220311"/>
+              <a:ext cx="2207802" cy="314305"/>
+            </a:xfrm>
+            <a:prstGeom prst="rect">
+              <a:avLst/>
+            </a:prstGeom>
+            <a:solidFill>
+              <a:schemeClr val="accent2">
+                <a:lumMod val="40000"/>
+                <a:lumOff val="60000"/>
+              </a:schemeClr>
+            </a:solidFill>
+            <a:ln w="12700">
+              <a:solidFill>
+                <a:schemeClr val="accent2">
+                  <a:lumMod val="40000"/>
+                  <a:lumOff val="60000"/>
+                </a:schemeClr>
+              </a:solidFill>
+            </a:ln>
+          </p:spPr>
+          <p:style>
+            <a:lnRef idx="2">
+              <a:schemeClr val="accent1">
+                <a:shade val="15000"/>
+              </a:schemeClr>
+            </a:lnRef>
+            <a:fillRef idx="1">
+              <a:schemeClr val="accent1"/>
+            </a:fillRef>
+            <a:effectRef idx="0">
+              <a:schemeClr val="accent1"/>
+            </a:effectRef>
+            <a:fontRef idx="minor">
+              <a:schemeClr val="lt1"/>
+            </a:fontRef>
+          </p:style>
+          <p:txBody>
+            <a:bodyPr rtlCol="0" anchor="ctr"/>
+            <a:lstStyle/>
+            <a:p>
+              <a:pPr algn="ctr"/>
+              <a:r>
+                <a:rPr lang="en-US" sz="1099" dirty="0" err="1">
+                  <a:solidFill>
+                    <a:schemeClr val="tx1"/>
+                  </a:solidFill>
+                  <a:latin typeface="CMU Concrete Roman" panose="02000603000000000000" pitchFamily="2" charset="0"/>
+                  <a:ea typeface="CMU Concrete Roman" panose="02000603000000000000" pitchFamily="2" charset="0"/>
+                  <a:cs typeface="CMU Concrete Roman" panose="02000603000000000000" pitchFamily="2" charset="0"/>
+                </a:rPr>
+                <a:t>SessionAPI</a:t>
+              </a:r>
+              <a:endParaRPr lang="en-US" sz="1099" dirty="0">
+                <a:solidFill>
+                  <a:schemeClr val="tx1"/>
+                </a:solidFill>
+                <a:latin typeface="CMU Concrete Roman" panose="02000603000000000000" pitchFamily="2" charset="0"/>
+                <a:ea typeface="CMU Concrete Roman" panose="02000603000000000000" pitchFamily="2" charset="0"/>
+                <a:cs typeface="CMU Concrete Roman" panose="02000603000000000000" pitchFamily="2" charset="0"/>
+              </a:endParaRPr>
+            </a:p>
+          </p:txBody>
+        </p:sp>
+        <p:sp>
+          <p:nvSpPr>
+            <p:cNvPr id="325" name="Rectangle 324">
+              <a:extLst>
+                <a:ext uri="{FF2B5EF4-FFF2-40B4-BE49-F238E27FC236}">
+                  <a16:creationId xmlns:a16="http://schemas.microsoft.com/office/drawing/2014/main" id="{EF16E7B7-4F63-2FFC-4354-B5401413707D}"/>
+                </a:ext>
+              </a:extLst>
+            </p:cNvPr>
+            <p:cNvSpPr/>
+            <p:nvPr/>
+          </p:nvSpPr>
+          <p:spPr>
+            <a:xfrm>
+              <a:off x="970399" y="5532873"/>
+              <a:ext cx="1826895" cy="235729"/>
+            </a:xfrm>
+            <a:prstGeom prst="rect">
+              <a:avLst/>
+            </a:prstGeom>
+            <a:solidFill>
+              <a:srgbClr val="FFE8DE">
+                <a:alpha val="78039"/>
+              </a:srgbClr>
+            </a:solidFill>
+            <a:ln w="12700">
+              <a:solidFill>
+                <a:schemeClr val="accent2">
+                  <a:lumMod val="40000"/>
+                  <a:lumOff val="60000"/>
+                </a:schemeClr>
+              </a:solidFill>
+            </a:ln>
+          </p:spPr>
+          <p:style>
+            <a:lnRef idx="2">
+              <a:schemeClr val="accent1">
+                <a:shade val="15000"/>
+              </a:schemeClr>
+            </a:lnRef>
+            <a:fillRef idx="1">
+              <a:schemeClr val="accent1"/>
+            </a:fillRef>
+            <a:effectRef idx="0">
+              <a:schemeClr val="accent1"/>
+            </a:effectRef>
+            <a:fontRef idx="minor">
+              <a:schemeClr val="lt1"/>
+            </a:fontRef>
+          </p:style>
+          <p:txBody>
+            <a:bodyPr rtlCol="0" anchor="ctr"/>
+            <a:lstStyle/>
+            <a:p>
+              <a:r>
+                <a:rPr lang="en-US" sz="999" dirty="0" err="1">
+                  <a:solidFill>
+                    <a:schemeClr val="tx1"/>
+                  </a:solidFill>
+                  <a:latin typeface="CMU Concrete Roman" panose="02000603000000000000" pitchFamily="2" charset="0"/>
+                  <a:ea typeface="CMU Concrete Roman" panose="02000603000000000000" pitchFamily="2" charset="0"/>
+                  <a:cs typeface="CMU Concrete Roman" panose="02000603000000000000" pitchFamily="2" charset="0"/>
+                </a:rPr>
+                <a:t>/StartSession</a:t>
+              </a:r>
+              <a:endParaRPr lang="en-US" sz="999" dirty="0">
+                <a:solidFill>
+                  <a:schemeClr val="tx1"/>
+                </a:solidFill>
+                <a:latin typeface="CMU Concrete Roman" panose="02000603000000000000" pitchFamily="2" charset="0"/>
+                <a:ea typeface="CMU Concrete Roman" panose="02000603000000000000" pitchFamily="2" charset="0"/>
+                <a:cs typeface="CMU Concrete Roman" panose="02000603000000000000" pitchFamily="2" charset="0"/>
+              </a:endParaRPr>
+            </a:p>
+          </p:txBody>
+        </p:sp>
+        <p:sp>
+          <p:nvSpPr>
+            <p:cNvPr id="326" name="Rectangle 325">
+              <a:extLst>
+                <a:ext uri="{FF2B5EF4-FFF2-40B4-BE49-F238E27FC236}">
+                  <a16:creationId xmlns:a16="http://schemas.microsoft.com/office/drawing/2014/main" id="{24565E72-B522-2384-99F0-CA877142E536}"/>
+                </a:ext>
+              </a:extLst>
+            </p:cNvPr>
+            <p:cNvSpPr/>
+            <p:nvPr/>
+          </p:nvSpPr>
+          <p:spPr>
+            <a:xfrm>
+              <a:off x="967968" y="6245988"/>
+              <a:ext cx="1826895" cy="235729"/>
+            </a:xfrm>
+            <a:prstGeom prst="rect">
+              <a:avLst/>
+            </a:prstGeom>
+            <a:solidFill>
+              <a:srgbClr val="FFE8DE">
+                <a:alpha val="78039"/>
+              </a:srgbClr>
+            </a:solidFill>
+            <a:ln w="12700">
+              <a:solidFill>
+                <a:schemeClr val="accent2">
+                  <a:lumMod val="40000"/>
+                  <a:lumOff val="60000"/>
+                </a:schemeClr>
+              </a:solidFill>
+            </a:ln>
+          </p:spPr>
+          <p:style>
+            <a:lnRef idx="2">
+              <a:schemeClr val="accent1">
+                <a:shade val="15000"/>
+              </a:schemeClr>
+            </a:lnRef>
+            <a:fillRef idx="1">
+              <a:schemeClr val="accent1"/>
+            </a:fillRef>
+            <a:effectRef idx="0">
+              <a:schemeClr val="accent1"/>
+            </a:effectRef>
+            <a:fontRef idx="minor">
+              <a:schemeClr val="lt1"/>
+            </a:fontRef>
+          </p:style>
+          <p:txBody>
+            <a:bodyPr rtlCol="0" anchor="ctr"/>
+            <a:lstStyle/>
+            <a:p>
+              <a:r>
+                <a:rPr lang="en-US" sz="999" dirty="0" err="1">
+                  <a:solidFill>
+                    <a:schemeClr val="tx1"/>
+                  </a:solidFill>
+                  <a:latin typeface="CMU Concrete Roman" panose="02000603000000000000" pitchFamily="2" charset="0"/>
+                  <a:ea typeface="CMU Concrete Roman" panose="02000603000000000000" pitchFamily="2" charset="0"/>
+                  <a:cs typeface="CMU Concrete Roman" panose="02000603000000000000" pitchFamily="2" charset="0"/>
+                </a:rPr>
+                <a:t>/{id}/EndSession</a:t>
+              </a:r>
+            </a:p>
+          </p:txBody>
+        </p:sp>
+        <p:sp>
+          <p:nvSpPr>
+            <p:cNvPr id="327" name="Rectangle 326">
+              <a:extLst>
+                <a:ext uri="{FF2B5EF4-FFF2-40B4-BE49-F238E27FC236}">
+                  <a16:creationId xmlns:a16="http://schemas.microsoft.com/office/drawing/2014/main" id="{A0B89CFE-8AF1-A91F-61D5-84405BE8496A}"/>
+                </a:ext>
+              </a:extLst>
+            </p:cNvPr>
+            <p:cNvSpPr/>
+            <p:nvPr/>
+          </p:nvSpPr>
+          <p:spPr>
+            <a:xfrm>
+              <a:off x="968610" y="6002590"/>
+              <a:ext cx="1826895" cy="235729"/>
+            </a:xfrm>
+            <a:prstGeom prst="rect">
+              <a:avLst/>
+            </a:prstGeom>
+            <a:solidFill>
+              <a:srgbClr val="FFE8DE">
+                <a:alpha val="78039"/>
+              </a:srgbClr>
+            </a:solidFill>
+            <a:ln w="12700">
+              <a:solidFill>
+                <a:schemeClr val="accent2">
+                  <a:lumMod val="40000"/>
+                  <a:lumOff val="60000"/>
+                </a:schemeClr>
+              </a:solidFill>
+            </a:ln>
+          </p:spPr>
+          <p:style>
+            <a:lnRef idx="2">
+              <a:schemeClr val="accent1">
+                <a:shade val="15000"/>
+              </a:schemeClr>
+            </a:lnRef>
+            <a:fillRef idx="1">
+              <a:schemeClr val="accent1"/>
+            </a:fillRef>
+            <a:effectRef idx="0">
+              <a:schemeClr val="accent1"/>
+            </a:effectRef>
+            <a:fontRef idx="minor">
+              <a:schemeClr val="lt1"/>
+            </a:fontRef>
+          </p:style>
+          <p:txBody>
+            <a:bodyPr rtlCol="0" anchor="ctr"/>
+            <a:lstStyle/>
+            <a:p>
+              <a:r>
+                <a:rPr lang="en-US" sz="999" dirty="0" err="1">
+                  <a:solidFill>
+                    <a:schemeClr val="tx1"/>
+                  </a:solidFill>
+                  <a:latin typeface="CMU Concrete Roman" panose="02000603000000000000" pitchFamily="2" charset="0"/>
+                  <a:ea typeface="CMU Concrete Roman" panose="02000603000000000000" pitchFamily="2" charset="0"/>
+                  <a:cs typeface="CMU Concrete Roman" panose="02000603000000000000" pitchFamily="2" charset="0"/>
+                </a:rPr>
+                <a:t>/StartPause</a:t>
+              </a:r>
+            </a:p>
+          </p:txBody>
+        </p:sp>
+        <p:sp>
+          <p:nvSpPr>
+            <p:cNvPr id="328" name="Rectangle 327">
+              <a:extLst>
+                <a:ext uri="{FF2B5EF4-FFF2-40B4-BE49-F238E27FC236}">
+                  <a16:creationId xmlns:a16="http://schemas.microsoft.com/office/drawing/2014/main" id="{E1F52EAB-C119-4A97-2D3E-3C53BCF4ED6D}"/>
+                </a:ext>
+              </a:extLst>
+            </p:cNvPr>
+            <p:cNvSpPr/>
+            <p:nvPr/>
+          </p:nvSpPr>
+          <p:spPr>
+            <a:xfrm>
+              <a:off x="967968" y="5766860"/>
+              <a:ext cx="1826895" cy="235729"/>
+            </a:xfrm>
+            <a:prstGeom prst="rect">
+              <a:avLst/>
+            </a:prstGeom>
+            <a:solidFill>
+              <a:srgbClr val="FFE8DE">
+                <a:alpha val="78039"/>
+              </a:srgbClr>
+            </a:solidFill>
+            <a:ln w="12700">
+              <a:solidFill>
+                <a:schemeClr val="accent2">
+                  <a:lumMod val="40000"/>
+                  <a:lumOff val="60000"/>
+                </a:schemeClr>
+              </a:solidFill>
+            </a:ln>
+          </p:spPr>
+          <p:style>
+            <a:lnRef idx="2">
+              <a:schemeClr val="accent1">
+                <a:shade val="15000"/>
+              </a:schemeClr>
+            </a:lnRef>
+            <a:fillRef idx="1">
+              <a:schemeClr val="accent1"/>
+            </a:fillRef>
+            <a:effectRef idx="0">
+              <a:schemeClr val="accent1"/>
+            </a:effectRef>
+            <a:fontRef idx="minor">
+              <a:schemeClr val="lt1"/>
+            </a:fontRef>
+          </p:style>
+          <p:txBody>
+            <a:bodyPr rtlCol="0" anchor="ctr"/>
+            <a:lstStyle/>
+            <a:p>
+              <a:r>
+                <a:rPr lang="en-US" sz="999" dirty="0" err="1">
+                  <a:solidFill>
+                    <a:schemeClr val="tx1"/>
+                  </a:solidFill>
+                  <a:latin typeface="CMU Concrete Roman" panose="02000603000000000000" pitchFamily="2" charset="0"/>
+                  <a:ea typeface="CMU Concrete Roman" panose="02000603000000000000" pitchFamily="2" charset="0"/>
+                  <a:cs typeface="CMU Concrete Roman" panose="02000603000000000000" pitchFamily="2" charset="0"/>
+                </a:rPr>
+                <a:t>/ExtendSession</a:t>
+              </a:r>
+            </a:p>
+          </p:txBody>
+        </p:sp>
+      </p:grpSp>
+      <p:cxnSp>
+        <p:nvCxnSpPr>
+          <p:cNvPr id="329" name="Elbow Connector 328">
+            <a:extLst>
+              <a:ext uri="{FF2B5EF4-FFF2-40B4-BE49-F238E27FC236}">
+                <a16:creationId xmlns:a16="http://schemas.microsoft.com/office/drawing/2014/main" id="{DE810779-DFFE-3D40-DB01-5EF93718B1C9}"/>
+              </a:ext>
+            </a:extLst>
+          </p:cNvPr>
+          <p:cNvCxnSpPr>
+            <a:cxnSpLocks/>
+            <a:stCxn id="325" idx="3"/>
+            <a:endCxn id="149" idx="7"/>
+          </p:cNvCxnSpPr>
+          <p:nvPr/>
+        </p:nvCxnSpPr>
+        <p:spPr>
+          <a:xfrm flipV="1">
+            <a:off x="3575058" y="4425244"/>
+            <a:ext cx="1538809" cy="1225494"/>
+          </a:xfrm>
+          <a:prstGeom prst="bentConnector3">
+            <a:avLst>
+              <a:gd name="adj1" fmla="val 43768"/>
+            </a:avLst>
+          </a:prstGeom>
+          <a:ln w="15875">
+            <a:solidFill>
+              <a:schemeClr val="bg1">
+                <a:lumMod val="50000"/>
+              </a:schemeClr>
+            </a:solidFill>
+            <a:tailEnd type="triangle"/>
+          </a:ln>
+        </p:spPr>
+        <p:style>
+          <a:lnRef idx="2">
+            <a:schemeClr val="accent1"/>
+          </a:lnRef>
+          <a:fillRef idx="0">
+            <a:schemeClr val="accent1"/>
+          </a:fillRef>
+          <a:effectRef idx="1">
+            <a:schemeClr val="accent1"/>
+          </a:effectRef>
+          <a:fontRef idx="minor">
+            <a:schemeClr val="tx1"/>
+          </a:fontRef>
+        </p:style>
+      </p:cxnSp>
+      <p:cxnSp>
+        <p:nvCxnSpPr>
+          <p:cNvPr id="331" name="Elbow Connector 330">
+            <a:extLst>
+              <a:ext uri="{FF2B5EF4-FFF2-40B4-BE49-F238E27FC236}">
+                <a16:creationId xmlns:a16="http://schemas.microsoft.com/office/drawing/2014/main" id="{12A5CEA1-0D49-6F8E-95BC-CD264790D035}"/>
+              </a:ext>
+            </a:extLst>
+          </p:cNvPr>
+          <p:cNvCxnSpPr>
+            <a:cxnSpLocks/>
+            <a:stCxn id="326" idx="3"/>
+            <a:endCxn id="161" idx="2"/>
+          </p:cNvCxnSpPr>
+          <p:nvPr/>
+        </p:nvCxnSpPr>
+        <p:spPr>
+          <a:xfrm>
+            <a:off x="3572627" y="6363853"/>
+            <a:ext cx="1540602" cy="344501"/>
+          </a:xfrm>
+          <a:prstGeom prst="bentConnector3">
+            <a:avLst>
+              <a:gd name="adj1" fmla="val 53411"/>
+            </a:avLst>
+          </a:prstGeom>
+          <a:ln w="15875">
+            <a:solidFill>
+              <a:schemeClr val="bg1">
+                <a:lumMod val="50000"/>
+              </a:schemeClr>
+            </a:solidFill>
+            <a:tailEnd type="triangle"/>
+          </a:ln>
+        </p:spPr>
+        <p:style>
+          <a:lnRef idx="2">
+            <a:schemeClr val="accent1"/>
+          </a:lnRef>
+          <a:fillRef idx="0">
+            <a:schemeClr val="accent1"/>
+          </a:fillRef>
+          <a:effectRef idx="1">
+            <a:schemeClr val="accent1"/>
+          </a:effectRef>
+          <a:fontRef idx="minor">
+            <a:schemeClr val="tx1"/>
+          </a:fontRef>
+        </p:style>
+      </p:cxnSp>
+      <p:cxnSp>
+        <p:nvCxnSpPr>
+          <p:cNvPr id="333" name="Elbow Connector 332">
+            <a:extLst>
+              <a:ext uri="{FF2B5EF4-FFF2-40B4-BE49-F238E27FC236}">
+                <a16:creationId xmlns:a16="http://schemas.microsoft.com/office/drawing/2014/main" id="{43AD061A-DF44-742E-4ADB-A68870497E9C}"/>
+              </a:ext>
+            </a:extLst>
+          </p:cNvPr>
+          <p:cNvCxnSpPr>
+            <a:cxnSpLocks/>
+            <a:stCxn id="327" idx="3"/>
+            <a:endCxn id="155" idx="2"/>
+          </p:cNvCxnSpPr>
+          <p:nvPr/>
+        </p:nvCxnSpPr>
+        <p:spPr>
+          <a:xfrm>
+            <a:off x="3573269" y="6120455"/>
+            <a:ext cx="1533030" cy="42664"/>
+          </a:xfrm>
+          <a:prstGeom prst="bentConnector3">
+            <a:avLst>
+              <a:gd name="adj1" fmla="val 68512"/>
+            </a:avLst>
+          </a:prstGeom>
+          <a:ln w="15875">
+            <a:solidFill>
+              <a:schemeClr val="bg1">
+                <a:lumMod val="50000"/>
+              </a:schemeClr>
+            </a:solidFill>
+            <a:tailEnd type="triangle"/>
+          </a:ln>
+        </p:spPr>
+        <p:style>
+          <a:lnRef idx="2">
+            <a:schemeClr val="accent1"/>
+          </a:lnRef>
+          <a:fillRef idx="0">
+            <a:schemeClr val="accent1"/>
+          </a:fillRef>
+          <a:effectRef idx="1">
+            <a:schemeClr val="accent1"/>
+          </a:effectRef>
+          <a:fontRef idx="minor">
+            <a:schemeClr val="tx1"/>
+          </a:fontRef>
+        </p:style>
+      </p:cxnSp>
+      <p:cxnSp>
+        <p:nvCxnSpPr>
+          <p:cNvPr id="335" name="Elbow Connector 334">
+            <a:extLst>
+              <a:ext uri="{FF2B5EF4-FFF2-40B4-BE49-F238E27FC236}">
+                <a16:creationId xmlns:a16="http://schemas.microsoft.com/office/drawing/2014/main" id="{876D967E-BFB9-7F65-A222-0373818A7EB3}"/>
+              </a:ext>
+            </a:extLst>
+          </p:cNvPr>
+          <p:cNvCxnSpPr>
+            <a:cxnSpLocks/>
+            <a:stCxn id="328" idx="3"/>
+            <a:endCxn id="158" idx="2"/>
+          </p:cNvCxnSpPr>
+          <p:nvPr/>
+        </p:nvCxnSpPr>
+        <p:spPr>
+          <a:xfrm flipV="1">
+            <a:off x="3572627" y="5650738"/>
+            <a:ext cx="1533672" cy="233987"/>
+          </a:xfrm>
+          <a:prstGeom prst="bentConnector3">
+            <a:avLst>
+              <a:gd name="adj1" fmla="val 69189"/>
+            </a:avLst>
+          </a:prstGeom>
+          <a:ln w="15875">
+            <a:solidFill>
+              <a:schemeClr val="bg1">
+                <a:lumMod val="50000"/>
+              </a:schemeClr>
+            </a:solidFill>
+            <a:tailEnd type="triangle"/>
+          </a:ln>
+        </p:spPr>
+        <p:style>
+          <a:lnRef idx="2">
+            <a:schemeClr val="accent1"/>
+          </a:lnRef>
+          <a:fillRef idx="0">
+            <a:schemeClr val="accent1"/>
+          </a:fillRef>
+          <a:effectRef idx="1">
+            <a:schemeClr val="accent1"/>
+          </a:effectRef>
+          <a:fontRef idx="minor">
+            <a:schemeClr val="tx1"/>
+          </a:fontRef>
+        </p:style>
+      </p:cxnSp>
+      <p:cxnSp>
+        <p:nvCxnSpPr>
+          <p:cNvPr id="346" name="Elbow Connector 345">
+            <a:extLst>
+              <a:ext uri="{FF2B5EF4-FFF2-40B4-BE49-F238E27FC236}">
+                <a16:creationId xmlns:a16="http://schemas.microsoft.com/office/drawing/2014/main" id="{3C80DF11-F41F-7F78-982F-C28881A36D20}"/>
+              </a:ext>
+            </a:extLst>
+          </p:cNvPr>
+          <p:cNvCxnSpPr>
+            <a:cxnSpLocks/>
+            <a:stCxn id="328" idx="3"/>
+            <a:endCxn id="152" idx="6"/>
+          </p:cNvCxnSpPr>
+          <p:nvPr/>
+        </p:nvCxnSpPr>
+        <p:spPr>
+          <a:xfrm flipV="1">
+            <a:off x="3572627" y="5034844"/>
+            <a:ext cx="1535594" cy="849881"/>
+          </a:xfrm>
+          <a:prstGeom prst="bentConnector3">
+            <a:avLst>
+              <a:gd name="adj1" fmla="val 55333"/>
+            </a:avLst>
+          </a:prstGeom>
+          <a:ln w="15875">
+            <a:solidFill>
+              <a:schemeClr val="bg1">
+                <a:lumMod val="50000"/>
+              </a:schemeClr>
+            </a:solidFill>
+            <a:tailEnd type="triangle"/>
+          </a:ln>
+        </p:spPr>
+        <p:style>
+          <a:lnRef idx="2">
+            <a:schemeClr val="accent1"/>
+          </a:lnRef>
+          <a:fillRef idx="0">
+            <a:schemeClr val="accent1"/>
+          </a:fillRef>
+          <a:effectRef idx="1">
+            <a:schemeClr val="accent1"/>
+          </a:effectRef>
+          <a:fontRef idx="minor">
+            <a:schemeClr val="tx1"/>
+          </a:fontRef>
+        </p:style>
+      </p:cxnSp>
     </p:spTree>
     <p:extLst>
       <p:ext uri="{BB962C8B-B14F-4D97-AF65-F5344CB8AC3E}">

</xml_diff>

<commit_message>
L30 burn added + Pigeons now appear on dashboard
</commit_message>
<xml_diff>
--- a/doc/Event Flow.pptx
+++ b/doc/Event Flow.pptx
@@ -104,6 +104,11 @@
       </a:defRPr>
     </a:lvl9pPr>
   </p:defaultTextStyle>
+  <p:extLst>
+    <p:ext uri="{EFAFB233-063F-42B5-8137-9DF3F51BA10A}">
+      <p15:sldGuideLst xmlns:p15="http://schemas.microsoft.com/office/powerpoint/2012/main"/>
+    </p:ext>
+  </p:extLst>
 </p:presentation>
 </file>
 
@@ -238,7 +243,7 @@
           <a:p>
             <a:fld id="{D6FF9B72-3690-4244-B717-5E545FF35495}" type="datetimeFigureOut">
               <a:rPr lang="en-US" smtClean="0"/>
-              <a:t>3/27/25</a:t>
+              <a:t>3/31/25</a:t>
             </a:fld>
             <a:endParaRPr lang="en-US"/>
           </a:p>
@@ -408,7 +413,7 @@
           <a:p>
             <a:fld id="{D6FF9B72-3690-4244-B717-5E545FF35495}" type="datetimeFigureOut">
               <a:rPr lang="en-US" smtClean="0"/>
-              <a:t>3/27/25</a:t>
+              <a:t>3/31/25</a:t>
             </a:fld>
             <a:endParaRPr lang="en-US"/>
           </a:p>
@@ -588,7 +593,7 @@
           <a:p>
             <a:fld id="{D6FF9B72-3690-4244-B717-5E545FF35495}" type="datetimeFigureOut">
               <a:rPr lang="en-US" smtClean="0"/>
-              <a:t>3/27/25</a:t>
+              <a:t>3/31/25</a:t>
             </a:fld>
             <a:endParaRPr lang="en-US"/>
           </a:p>
@@ -758,7 +763,7 @@
           <a:p>
             <a:fld id="{D6FF9B72-3690-4244-B717-5E545FF35495}" type="datetimeFigureOut">
               <a:rPr lang="en-US" smtClean="0"/>
-              <a:t>3/27/25</a:t>
+              <a:t>3/31/25</a:t>
             </a:fld>
             <a:endParaRPr lang="en-US"/>
           </a:p>
@@ -1004,7 +1009,7 @@
           <a:p>
             <a:fld id="{D6FF9B72-3690-4244-B717-5E545FF35495}" type="datetimeFigureOut">
               <a:rPr lang="en-US" smtClean="0"/>
-              <a:t>3/27/25</a:t>
+              <a:t>3/31/25</a:t>
             </a:fld>
             <a:endParaRPr lang="en-US"/>
           </a:p>
@@ -1236,7 +1241,7 @@
           <a:p>
             <a:fld id="{D6FF9B72-3690-4244-B717-5E545FF35495}" type="datetimeFigureOut">
               <a:rPr lang="en-US" smtClean="0"/>
-              <a:t>3/27/25</a:t>
+              <a:t>3/31/25</a:t>
             </a:fld>
             <a:endParaRPr lang="en-US"/>
           </a:p>
@@ -1603,7 +1608,7 @@
           <a:p>
             <a:fld id="{D6FF9B72-3690-4244-B717-5E545FF35495}" type="datetimeFigureOut">
               <a:rPr lang="en-US" smtClean="0"/>
-              <a:t>3/27/25</a:t>
+              <a:t>3/31/25</a:t>
             </a:fld>
             <a:endParaRPr lang="en-US"/>
           </a:p>
@@ -1721,7 +1726,7 @@
           <a:p>
             <a:fld id="{D6FF9B72-3690-4244-B717-5E545FF35495}" type="datetimeFigureOut">
               <a:rPr lang="en-US" smtClean="0"/>
-              <a:t>3/27/25</a:t>
+              <a:t>3/31/25</a:t>
             </a:fld>
             <a:endParaRPr lang="en-US"/>
           </a:p>
@@ -1816,7 +1821,7 @@
           <a:p>
             <a:fld id="{D6FF9B72-3690-4244-B717-5E545FF35495}" type="datetimeFigureOut">
               <a:rPr lang="en-US" smtClean="0"/>
-              <a:t>3/27/25</a:t>
+              <a:t>3/31/25</a:t>
             </a:fld>
             <a:endParaRPr lang="en-US"/>
           </a:p>
@@ -2093,7 +2098,7 @@
           <a:p>
             <a:fld id="{D6FF9B72-3690-4244-B717-5E545FF35495}" type="datetimeFigureOut">
               <a:rPr lang="en-US" smtClean="0"/>
-              <a:t>3/27/25</a:t>
+              <a:t>3/31/25</a:t>
             </a:fld>
             <a:endParaRPr lang="en-US"/>
           </a:p>
@@ -2350,7 +2355,7 @@
           <a:p>
             <a:fld id="{D6FF9B72-3690-4244-B717-5E545FF35495}" type="datetimeFigureOut">
               <a:rPr lang="en-US" smtClean="0"/>
-              <a:t>3/27/25</a:t>
+              <a:t>3/31/25</a:t>
             </a:fld>
             <a:endParaRPr lang="en-US"/>
           </a:p>
@@ -2563,7 +2568,7 @@
           <a:p>
             <a:fld id="{D6FF9B72-3690-4244-B717-5E545FF35495}" type="datetimeFigureOut">
               <a:rPr lang="en-US" smtClean="0"/>
-              <a:t>3/27/25</a:t>
+              <a:t>3/31/25</a:t>
             </a:fld>
             <a:endParaRPr lang="en-US"/>
           </a:p>
@@ -2970,55 +2975,6 @@
       </p:grpSpPr>
       <p:cxnSp>
         <p:nvCxnSpPr>
-          <p:cNvPr id="8" name="Straight Arrow Connector 7">
-            <a:extLst>
-              <a:ext uri="{FF2B5EF4-FFF2-40B4-BE49-F238E27FC236}">
-                <a16:creationId xmlns:a16="http://schemas.microsoft.com/office/drawing/2014/main" id="{06743344-B65B-D998-9230-6D093DD4B38E}"/>
-              </a:ext>
-            </a:extLst>
-          </p:cNvPr>
-          <p:cNvCxnSpPr>
-            <a:cxnSpLocks/>
-            <a:stCxn id="4" idx="0"/>
-            <a:endCxn id="13" idx="1"/>
-          </p:cNvCxnSpPr>
-          <p:nvPr/>
-        </p:nvCxnSpPr>
-        <p:spPr>
-          <a:xfrm flipV="1">
-            <a:off x="7131014" y="1601469"/>
-            <a:ext cx="1417995" cy="1"/>
-          </a:xfrm>
-          <a:prstGeom prst="bentConnector3">
-            <a:avLst>
-              <a:gd name="adj1" fmla="val 50000"/>
-            </a:avLst>
-          </a:prstGeom>
-          <a:ln w="9525">
-            <a:solidFill>
-              <a:srgbClr val="FF0000"/>
-            </a:solidFill>
-            <a:prstDash val="dash"/>
-            <a:tailEnd type="triangle"/>
-          </a:ln>
-        </p:spPr>
-        <p:style>
-          <a:lnRef idx="2">
-            <a:schemeClr val="accent1"/>
-          </a:lnRef>
-          <a:fillRef idx="0">
-            <a:schemeClr val="accent1"/>
-          </a:fillRef>
-          <a:effectRef idx="1">
-            <a:schemeClr val="accent1"/>
-          </a:effectRef>
-          <a:fontRef idx="minor">
-            <a:schemeClr val="tx1"/>
-          </a:fontRef>
-        </p:style>
-      </p:cxnSp>
-      <p:cxnSp>
-        <p:nvCxnSpPr>
           <p:cNvPr id="10" name="Straight Arrow Connector 9">
             <a:extLst>
               <a:ext uri="{FF2B5EF4-FFF2-40B4-BE49-F238E27FC236}">
@@ -3035,7 +2991,7 @@
         </p:nvCxnSpPr>
         <p:spPr>
           <a:xfrm flipV="1">
-            <a:off x="7131014" y="1837199"/>
+            <a:off x="7160511" y="2574617"/>
             <a:ext cx="1417994" cy="402707"/>
           </a:xfrm>
           <a:prstGeom prst="bentConnector3">
@@ -3080,7 +3036,7 @@
         </p:nvGrpSpPr>
         <p:grpSpPr>
           <a:xfrm>
-            <a:off x="8244525" y="1169298"/>
+            <a:off x="8274022" y="1906716"/>
             <a:ext cx="2131378" cy="785764"/>
             <a:chOff x="3377381" y="100584"/>
             <a:chExt cx="2133600" cy="786583"/>
@@ -3335,7 +3291,7 @@
         </p:nvCxnSpPr>
         <p:spPr>
           <a:xfrm flipV="1">
-            <a:off x="10375903" y="1296730"/>
+            <a:off x="10405400" y="2034148"/>
             <a:ext cx="790176" cy="304739"/>
           </a:xfrm>
           <a:prstGeom prst="bentConnector3">
@@ -3381,7 +3337,7 @@
         </p:nvGrpSpPr>
         <p:grpSpPr>
           <a:xfrm>
-            <a:off x="11166078" y="1178865"/>
+            <a:off x="11195575" y="1916283"/>
             <a:ext cx="2013514" cy="435293"/>
             <a:chOff x="1818966" y="1607578"/>
             <a:chExt cx="2015614" cy="435747"/>
@@ -3519,156 +3475,6 @@
       </p:grpSp>
       <p:grpSp>
         <p:nvGrpSpPr>
-          <p:cNvPr id="27" name="Group 26">
-            <a:extLst>
-              <a:ext uri="{FF2B5EF4-FFF2-40B4-BE49-F238E27FC236}">
-                <a16:creationId xmlns:a16="http://schemas.microsoft.com/office/drawing/2014/main" id="{EA79437D-66A2-7DDC-3171-BC2EE3FC7751}"/>
-              </a:ext>
-            </a:extLst>
-          </p:cNvPr>
-          <p:cNvGrpSpPr/>
-          <p:nvPr/>
-        </p:nvGrpSpPr>
-        <p:grpSpPr>
-          <a:xfrm>
-            <a:off x="5117499" y="1483604"/>
-            <a:ext cx="2013514" cy="429050"/>
-            <a:chOff x="1818964" y="496527"/>
-            <a:chExt cx="2015614" cy="429497"/>
-          </a:xfrm>
-        </p:grpSpPr>
-        <p:sp>
-          <p:nvSpPr>
-            <p:cNvPr id="4" name="Snip Single Corner of Rectangle 3">
-              <a:extLst>
-                <a:ext uri="{FF2B5EF4-FFF2-40B4-BE49-F238E27FC236}">
-                  <a16:creationId xmlns:a16="http://schemas.microsoft.com/office/drawing/2014/main" id="{F3F97111-E760-B8CD-4079-799F2376F2A1}"/>
-                </a:ext>
-              </a:extLst>
-            </p:cNvPr>
-            <p:cNvSpPr/>
-            <p:nvPr/>
-          </p:nvSpPr>
-          <p:spPr>
-            <a:xfrm>
-              <a:off x="1818965" y="496527"/>
-              <a:ext cx="2015613" cy="235975"/>
-            </a:xfrm>
-            <a:prstGeom prst="snip1Rect">
-              <a:avLst/>
-            </a:prstGeom>
-            <a:solidFill>
-              <a:schemeClr val="bg1">
-                <a:lumMod val="95000"/>
-              </a:schemeClr>
-            </a:solidFill>
-            <a:ln w="12700">
-              <a:solidFill>
-                <a:schemeClr val="bg1">
-                  <a:lumMod val="75000"/>
-                </a:schemeClr>
-              </a:solidFill>
-            </a:ln>
-          </p:spPr>
-          <p:style>
-            <a:lnRef idx="2">
-              <a:schemeClr val="accent1">
-                <a:shade val="15000"/>
-              </a:schemeClr>
-            </a:lnRef>
-            <a:fillRef idx="1">
-              <a:schemeClr val="accent1"/>
-            </a:fillRef>
-            <a:effectRef idx="0">
-              <a:schemeClr val="accent1"/>
-            </a:effectRef>
-            <a:fontRef idx="minor">
-              <a:schemeClr val="lt1"/>
-            </a:fontRef>
-          </p:style>
-          <p:txBody>
-            <a:bodyPr rtlCol="0" anchor="ctr"/>
-            <a:lstStyle/>
-            <a:p>
-              <a:pPr algn="ctr"/>
-              <a:r>
-                <a:rPr lang="en-US" sz="1099" dirty="0">
-                  <a:solidFill>
-                    <a:schemeClr val="tx1"/>
-                  </a:solidFill>
-                </a:rPr>
-                <a:t>PROBLEM_ATTEMPT_ENDED</a:t>
-              </a:r>
-            </a:p>
-          </p:txBody>
-        </p:sp>
-        <p:sp>
-          <p:nvSpPr>
-            <p:cNvPr id="26" name="Rectangle 25">
-              <a:extLst>
-                <a:ext uri="{FF2B5EF4-FFF2-40B4-BE49-F238E27FC236}">
-                  <a16:creationId xmlns:a16="http://schemas.microsoft.com/office/drawing/2014/main" id="{68606CDE-5ED3-3F4A-E30B-219E09581807}"/>
-                </a:ext>
-              </a:extLst>
-            </p:cNvPr>
-            <p:cNvSpPr/>
-            <p:nvPr/>
-          </p:nvSpPr>
-          <p:spPr>
-            <a:xfrm>
-              <a:off x="1818964" y="742790"/>
-              <a:ext cx="2015613" cy="183234"/>
-            </a:xfrm>
-            <a:prstGeom prst="rect">
-              <a:avLst/>
-            </a:prstGeom>
-            <a:noFill/>
-            <a:ln>
-              <a:solidFill>
-                <a:schemeClr val="bg1">
-                  <a:lumMod val="95000"/>
-                </a:schemeClr>
-              </a:solidFill>
-            </a:ln>
-          </p:spPr>
-          <p:style>
-            <a:lnRef idx="2">
-              <a:schemeClr val="accent1">
-                <a:shade val="15000"/>
-              </a:schemeClr>
-            </a:lnRef>
-            <a:fillRef idx="1">
-              <a:schemeClr val="accent1"/>
-            </a:fillRef>
-            <a:effectRef idx="0">
-              <a:schemeClr val="accent1"/>
-            </a:effectRef>
-            <a:fontRef idx="minor">
-              <a:schemeClr val="lt1"/>
-            </a:fontRef>
-          </p:style>
-          <p:txBody>
-            <a:bodyPr rtlCol="0" anchor="ctr"/>
-            <a:lstStyle/>
-            <a:p>
-              <a:pPr algn="ctr"/>
-              <a:r>
-                <a:rPr lang="en-US" sz="799">
-                  <a:solidFill>
-                    <a:schemeClr val="tx1"/>
-                  </a:solidFill>
-                  <a:latin typeface="CMU Concrete Roman" panose="02000603000000000000" pitchFamily="2" charset="0"/>
-                  <a:ea typeface="CMU Concrete Roman" panose="02000603000000000000" pitchFamily="2" charset="0"/>
-                  <a:cs typeface="CMU Concrete Roman" panose="02000603000000000000" pitchFamily="2" charset="0"/>
-                </a:rPr>
-                <a:t>ProblemAttemptDTO</a:t>
-              </a:r>
-            </a:p>
-          </p:txBody>
-        </p:sp>
-      </p:grpSp>
-      <p:grpSp>
-        <p:nvGrpSpPr>
           <p:cNvPr id="30" name="Group 29">
             <a:extLst>
               <a:ext uri="{FF2B5EF4-FFF2-40B4-BE49-F238E27FC236}">
@@ -3681,7 +3487,7 @@
         </p:nvGrpSpPr>
         <p:grpSpPr>
           <a:xfrm>
-            <a:off x="5117498" y="2122041"/>
+            <a:off x="5146995" y="2859459"/>
             <a:ext cx="2013516" cy="440215"/>
             <a:chOff x="1818963" y="1135628"/>
             <a:chExt cx="2015616" cy="440674"/>
@@ -3831,7 +3637,7 @@
         </p:nvSpPr>
         <p:spPr>
           <a:xfrm>
-            <a:off x="11166079" y="1744624"/>
+            <a:off x="11195576" y="2482042"/>
             <a:ext cx="2013513" cy="235729"/>
           </a:xfrm>
           <a:prstGeom prst="snip1Rect">
@@ -3900,7 +3706,7 @@
         </p:nvCxnSpPr>
         <p:spPr>
           <a:xfrm>
-            <a:off x="10375904" y="1837198"/>
+            <a:off x="10405401" y="2574616"/>
             <a:ext cx="790175" cy="25290"/>
           </a:xfrm>
           <a:prstGeom prst="bentConnector3">
@@ -3950,7 +3756,7 @@
         </p:nvCxnSpPr>
         <p:spPr>
           <a:xfrm>
-            <a:off x="13179592" y="1296730"/>
+            <a:off x="13209089" y="2034148"/>
             <a:ext cx="1487836" cy="1254629"/>
           </a:xfrm>
           <a:prstGeom prst="bentConnector3">
@@ -4001,7 +3807,7 @@
         </p:nvCxnSpPr>
         <p:spPr>
           <a:xfrm>
-            <a:off x="13179592" y="1296730"/>
+            <a:off x="13209089" y="2034148"/>
             <a:ext cx="1487836" cy="319475"/>
           </a:xfrm>
           <a:prstGeom prst="bentConnector3">
@@ -4050,7 +3856,7 @@
         </p:nvCxnSpPr>
         <p:spPr>
           <a:xfrm flipV="1">
-            <a:off x="13179592" y="1855926"/>
+            <a:off x="13209089" y="2593344"/>
             <a:ext cx="1487837" cy="6562"/>
           </a:xfrm>
           <a:prstGeom prst="bentConnector3">
@@ -4095,7 +3901,7 @@
         </p:nvGrpSpPr>
         <p:grpSpPr>
           <a:xfrm>
-            <a:off x="14362945" y="1174148"/>
+            <a:off x="14392442" y="1911566"/>
             <a:ext cx="2131378" cy="799642"/>
             <a:chOff x="8637640" y="105439"/>
             <a:chExt cx="2133600" cy="800476"/>
@@ -4371,7 +4177,7 @@
         </p:nvCxnSpPr>
         <p:spPr>
           <a:xfrm>
-            <a:off x="13179592" y="1296730"/>
+            <a:off x="13209089" y="2034148"/>
             <a:ext cx="1487836" cy="2084787"/>
           </a:xfrm>
           <a:prstGeom prst="bentConnector3">
@@ -4422,7 +4228,7 @@
         </p:nvCxnSpPr>
         <p:spPr>
           <a:xfrm>
-            <a:off x="13179592" y="1296729"/>
+            <a:off x="13209089" y="2034147"/>
             <a:ext cx="1487836" cy="2802548"/>
           </a:xfrm>
           <a:prstGeom prst="bentConnector3">
@@ -4469,7 +4275,7 @@
         </p:nvSpPr>
         <p:spPr>
           <a:xfrm>
-            <a:off x="11166079" y="3226940"/>
+            <a:off x="11195576" y="3964358"/>
             <a:ext cx="2013513" cy="235729"/>
           </a:xfrm>
           <a:prstGeom prst="snip1Rect">
@@ -4538,7 +4344,7 @@
         </p:nvCxnSpPr>
         <p:spPr>
           <a:xfrm>
-            <a:off x="13179592" y="3344804"/>
+            <a:off x="13209089" y="4082222"/>
             <a:ext cx="1487837" cy="1491976"/>
           </a:xfrm>
           <a:prstGeom prst="bentConnector3">
@@ -4589,7 +4395,7 @@
         </p:nvCxnSpPr>
         <p:spPr>
           <a:xfrm>
-            <a:off x="13179592" y="3344805"/>
+            <a:off x="13209089" y="4082223"/>
             <a:ext cx="1487837" cy="2531701"/>
           </a:xfrm>
           <a:prstGeom prst="bentConnector3">
@@ -4634,7 +4440,7 @@
         </p:nvGrpSpPr>
         <p:grpSpPr>
           <a:xfrm>
-            <a:off x="8168100" y="2830303"/>
+            <a:off x="8197597" y="3567721"/>
             <a:ext cx="2207802" cy="784021"/>
             <a:chOff x="3300877" y="102329"/>
             <a:chExt cx="2210104" cy="784838"/>
@@ -4889,7 +4695,7 @@
         </p:nvCxnSpPr>
         <p:spPr>
           <a:xfrm>
-            <a:off x="10375904" y="3260730"/>
+            <a:off x="10405401" y="3998148"/>
             <a:ext cx="790175" cy="84075"/>
           </a:xfrm>
           <a:prstGeom prst="bentConnector3">
@@ -4939,7 +4745,7 @@
         </p:nvCxnSpPr>
         <p:spPr>
           <a:xfrm flipV="1">
-            <a:off x="10375904" y="3344805"/>
+            <a:off x="10405401" y="4082223"/>
             <a:ext cx="790175" cy="151655"/>
           </a:xfrm>
           <a:prstGeom prst="bentConnector3">
@@ -4985,7 +4791,7 @@
         </p:nvSpPr>
         <p:spPr>
           <a:xfrm>
-            <a:off x="11048214" y="4920987"/>
+            <a:off x="11077711" y="5658405"/>
             <a:ext cx="2131377" cy="235729"/>
           </a:xfrm>
           <a:prstGeom prst="snip1Rect">
@@ -5050,7 +4856,7 @@
         </p:nvGrpSpPr>
         <p:grpSpPr>
           <a:xfrm>
-            <a:off x="5112591" y="2827624"/>
+            <a:off x="5142088" y="3565042"/>
             <a:ext cx="2013504" cy="445115"/>
             <a:chOff x="1818964" y="496527"/>
             <a:chExt cx="2133601" cy="445579"/>
@@ -5206,7 +5012,7 @@
         </p:nvCxnSpPr>
         <p:spPr>
           <a:xfrm>
-            <a:off x="7126096" y="2945489"/>
+            <a:off x="7155593" y="3682907"/>
             <a:ext cx="1422913" cy="315241"/>
           </a:xfrm>
           <a:prstGeom prst="bentConnector3">
@@ -5255,7 +5061,7 @@
         </p:nvCxnSpPr>
         <p:spPr>
           <a:xfrm flipH="1" flipV="1">
-            <a:off x="9462456" y="3614323"/>
+            <a:off x="9491953" y="4351741"/>
             <a:ext cx="3717134" cy="1424528"/>
           </a:xfrm>
           <a:prstGeom prst="bentConnector4">
@@ -5305,7 +5111,7 @@
         </p:nvCxnSpPr>
         <p:spPr>
           <a:xfrm>
-            <a:off x="7126096" y="2945489"/>
+            <a:off x="7155593" y="3682907"/>
             <a:ext cx="1422913" cy="1855891"/>
           </a:xfrm>
           <a:prstGeom prst="bentConnector3">
@@ -5350,7 +5156,7 @@
         </p:nvGrpSpPr>
         <p:grpSpPr>
           <a:xfrm>
-            <a:off x="5113867" y="4306253"/>
+            <a:off x="5143364" y="5043671"/>
             <a:ext cx="2017146" cy="431337"/>
             <a:chOff x="1815330" y="1135628"/>
             <a:chExt cx="2019250" cy="431787"/>
@@ -5625,7 +5431,7 @@
         </p:nvGrpSpPr>
         <p:grpSpPr>
           <a:xfrm>
-            <a:off x="5108221" y="4922635"/>
+            <a:off x="5137718" y="5660053"/>
             <a:ext cx="2017879" cy="430165"/>
             <a:chOff x="1814595" y="1135628"/>
             <a:chExt cx="2019984" cy="430614"/>
@@ -5908,7 +5714,7 @@
         </p:nvGrpSpPr>
         <p:grpSpPr>
           <a:xfrm>
-            <a:off x="5106296" y="6045254"/>
+            <a:off x="5135793" y="6782672"/>
             <a:ext cx="2013516" cy="430167"/>
             <a:chOff x="1818963" y="1135628"/>
             <a:chExt cx="2015616" cy="430616"/>
@@ -6058,7 +5864,7 @@
         </p:nvGrpSpPr>
         <p:grpSpPr>
           <a:xfrm>
-            <a:off x="5106296" y="5532873"/>
+            <a:off x="5135793" y="6270291"/>
             <a:ext cx="2013516" cy="430167"/>
             <a:chOff x="1818963" y="1135628"/>
             <a:chExt cx="2015616" cy="430616"/>
@@ -6208,7 +6014,7 @@
         </p:nvGrpSpPr>
         <p:grpSpPr>
           <a:xfrm>
-            <a:off x="5113226" y="6590489"/>
+            <a:off x="5142723" y="7327907"/>
             <a:ext cx="2013516" cy="428927"/>
             <a:chOff x="1818963" y="1135628"/>
             <a:chExt cx="2015616" cy="429374"/>
@@ -6362,7 +6168,7 @@
         </p:nvCxnSpPr>
         <p:spPr>
           <a:xfrm flipV="1">
-            <a:off x="7125066" y="5037110"/>
+            <a:off x="7154563" y="5774528"/>
             <a:ext cx="1423942" cy="910"/>
           </a:xfrm>
           <a:prstGeom prst="straightConnector1">
@@ -6409,7 +6215,7 @@
         </p:nvCxnSpPr>
         <p:spPr>
           <a:xfrm flipV="1">
-            <a:off x="7119812" y="5272839"/>
+            <a:off x="7149309" y="6010257"/>
             <a:ext cx="1429196" cy="890280"/>
           </a:xfrm>
           <a:prstGeom prst="bentConnector3">
@@ -6458,7 +6264,7 @@
         </p:nvCxnSpPr>
         <p:spPr>
           <a:xfrm flipV="1">
-            <a:off x="7119812" y="5272839"/>
+            <a:off x="7149309" y="6010257"/>
             <a:ext cx="1429196" cy="377899"/>
           </a:xfrm>
           <a:prstGeom prst="bentConnector3">
@@ -6503,7 +6309,7 @@
         </p:nvGrpSpPr>
         <p:grpSpPr>
           <a:xfrm>
-            <a:off x="8244525" y="4369210"/>
+            <a:off x="8274022" y="5106628"/>
             <a:ext cx="2131378" cy="1256229"/>
             <a:chOff x="3878827" y="3303830"/>
             <a:chExt cx="2133600" cy="1257539"/>
@@ -6927,7 +6733,7 @@
         </p:nvSpPr>
         <p:spPr>
           <a:xfrm>
-            <a:off x="11048212" y="4363074"/>
+            <a:off x="11077709" y="5100492"/>
             <a:ext cx="2131378" cy="235729"/>
           </a:xfrm>
           <a:prstGeom prst="snip1Rect">
@@ -6996,7 +6802,7 @@
         </p:nvCxnSpPr>
         <p:spPr>
           <a:xfrm flipV="1">
-            <a:off x="10375904" y="4480939"/>
+            <a:off x="10405401" y="5218357"/>
             <a:ext cx="672309" cy="320441"/>
           </a:xfrm>
           <a:prstGeom prst="bentConnector3">
@@ -7046,7 +6852,7 @@
         </p:nvCxnSpPr>
         <p:spPr>
           <a:xfrm>
-            <a:off x="10375903" y="5037109"/>
+            <a:off x="10405400" y="5774527"/>
             <a:ext cx="672310" cy="1742"/>
           </a:xfrm>
           <a:prstGeom prst="bentConnector3">
@@ -7096,7 +6902,7 @@
         </p:nvCxnSpPr>
         <p:spPr>
           <a:xfrm flipV="1">
-            <a:off x="10375903" y="5038852"/>
+            <a:off x="10405400" y="5776270"/>
             <a:ext cx="672310" cy="233987"/>
           </a:xfrm>
           <a:prstGeom prst="bentConnector3">
@@ -7146,7 +6952,7 @@
         </p:nvCxnSpPr>
         <p:spPr>
           <a:xfrm>
-            <a:off x="13179590" y="4480939"/>
+            <a:off x="13209087" y="5218357"/>
             <a:ext cx="1487838" cy="2116787"/>
           </a:xfrm>
           <a:prstGeom prst="bentConnector3">
@@ -7197,7 +7003,7 @@
         </p:nvCxnSpPr>
         <p:spPr>
           <a:xfrm>
-            <a:off x="13179590" y="5038851"/>
+            <a:off x="13209087" y="5776269"/>
             <a:ext cx="1487838" cy="1558874"/>
           </a:xfrm>
           <a:prstGeom prst="bentConnector3">
@@ -7639,7 +7445,7 @@
         </p:nvGrpSpPr>
         <p:grpSpPr>
           <a:xfrm>
-            <a:off x="14362945" y="5439811"/>
+            <a:off x="14392442" y="6177229"/>
             <a:ext cx="2133166" cy="554558"/>
             <a:chOff x="10340716" y="5578291"/>
             <a:chExt cx="2133166" cy="554558"/>
@@ -7871,7 +7677,7 @@
         </p:nvGrpSpPr>
         <p:grpSpPr>
           <a:xfrm>
-            <a:off x="14362945" y="2949346"/>
+            <a:off x="14392442" y="3686764"/>
             <a:ext cx="2135008" cy="550034"/>
             <a:chOff x="10340716" y="3087826"/>
             <a:chExt cx="2135008" cy="550034"/>
@@ -8103,7 +7909,7 @@
         </p:nvGrpSpPr>
         <p:grpSpPr>
           <a:xfrm>
-            <a:off x="14362946" y="4400086"/>
+            <a:off x="14392443" y="5137504"/>
             <a:ext cx="2133315" cy="554558"/>
             <a:chOff x="10340716" y="4538566"/>
             <a:chExt cx="2133315" cy="554558"/>
@@ -8335,7 +8141,7 @@
         </p:nvGrpSpPr>
         <p:grpSpPr>
           <a:xfrm>
-            <a:off x="14362945" y="3661641"/>
+            <a:off x="14392442" y="4399059"/>
             <a:ext cx="2135732" cy="555501"/>
             <a:chOff x="10340716" y="3800120"/>
             <a:chExt cx="2135732" cy="555501"/>
@@ -8567,7 +8373,7 @@
         </p:nvGrpSpPr>
         <p:grpSpPr>
           <a:xfrm>
-            <a:off x="14362945" y="6161031"/>
+            <a:off x="14392442" y="6898449"/>
             <a:ext cx="2131378" cy="554558"/>
             <a:chOff x="10340716" y="6299511"/>
             <a:chExt cx="2131378" cy="554558"/>
@@ -8799,7 +8605,7 @@
         </p:nvGrpSpPr>
         <p:grpSpPr>
           <a:xfrm>
-            <a:off x="14362945" y="2116926"/>
+            <a:off x="14392442" y="2854344"/>
             <a:ext cx="2133166" cy="552296"/>
             <a:chOff x="10340716" y="2255406"/>
             <a:chExt cx="2133166" cy="552296"/>
@@ -9035,7 +8841,7 @@
         </p:nvCxnSpPr>
         <p:spPr>
           <a:xfrm>
-            <a:off x="7127380" y="4395421"/>
+            <a:off x="7156877" y="5132839"/>
             <a:ext cx="7541837" cy="3040199"/>
           </a:xfrm>
           <a:prstGeom prst="bentConnector3">
@@ -9086,7 +8892,7 @@
         </p:nvCxnSpPr>
         <p:spPr>
           <a:xfrm>
-            <a:off x="7126100" y="4961924"/>
+            <a:off x="7155597" y="5699342"/>
             <a:ext cx="7543117" cy="2695635"/>
           </a:xfrm>
           <a:prstGeom prst="bentConnector3">
@@ -9133,7 +8939,7 @@
         </p:nvGrpSpPr>
         <p:grpSpPr>
           <a:xfrm>
-            <a:off x="14364734" y="6990132"/>
+            <a:off x="14394231" y="7727550"/>
             <a:ext cx="2134109" cy="785291"/>
             <a:chOff x="10342504" y="7128611"/>
             <a:chExt cx="2134109" cy="785291"/>
@@ -9462,7 +9268,7 @@
         </p:nvGrpSpPr>
         <p:grpSpPr>
           <a:xfrm>
-            <a:off x="1367256" y="5220311"/>
+            <a:off x="1012715" y="4057384"/>
             <a:ext cx="2207802" cy="1261406"/>
             <a:chOff x="589492" y="5220311"/>
             <a:chExt cx="2207802" cy="1261406"/>
@@ -9844,13 +9650,13 @@
           <p:nvPr/>
         </p:nvCxnSpPr>
         <p:spPr>
-          <a:xfrm flipV="1">
-            <a:off x="3575058" y="4425244"/>
-            <a:ext cx="1538809" cy="1225494"/>
+          <a:xfrm>
+            <a:off x="3220517" y="4487811"/>
+            <a:ext cx="1922847" cy="674851"/>
           </a:xfrm>
           <a:prstGeom prst="bentConnector3">
             <a:avLst>
-              <a:gd name="adj1" fmla="val 43768"/>
+              <a:gd name="adj1" fmla="val 74710"/>
             </a:avLst>
           </a:prstGeom>
           <a:ln w="15875">
@@ -9895,12 +9701,12 @@
         </p:nvCxnSpPr>
         <p:spPr>
           <a:xfrm>
-            <a:off x="3572627" y="6363853"/>
-            <a:ext cx="1540602" cy="344501"/>
+            <a:off x="3218086" y="5200926"/>
+            <a:ext cx="1924640" cy="2244846"/>
           </a:xfrm>
           <a:prstGeom prst="bentConnector3">
             <a:avLst>
-              <a:gd name="adj1" fmla="val 53411"/>
+              <a:gd name="adj1" fmla="val 22769"/>
             </a:avLst>
           </a:prstGeom>
           <a:ln w="15875">
@@ -9945,12 +9751,12 @@
         </p:nvCxnSpPr>
         <p:spPr>
           <a:xfrm>
-            <a:off x="3573269" y="6120455"/>
-            <a:ext cx="1533030" cy="42664"/>
+            <a:off x="3218728" y="4957528"/>
+            <a:ext cx="1917068" cy="1943009"/>
           </a:xfrm>
           <a:prstGeom prst="bentConnector3">
             <a:avLst>
-              <a:gd name="adj1" fmla="val 68512"/>
+              <a:gd name="adj1" fmla="val 38366"/>
             </a:avLst>
           </a:prstGeom>
           <a:ln w="15875">
@@ -9994,13 +9800,13 @@
           <p:nvPr/>
         </p:nvCxnSpPr>
         <p:spPr>
-          <a:xfrm flipV="1">
-            <a:off x="3572627" y="5650738"/>
-            <a:ext cx="1533672" cy="233987"/>
+          <a:xfrm>
+            <a:off x="3218086" y="4721798"/>
+            <a:ext cx="1917710" cy="1666358"/>
           </a:xfrm>
           <a:prstGeom prst="bentConnector3">
             <a:avLst>
-              <a:gd name="adj1" fmla="val 69189"/>
+              <a:gd name="adj1" fmla="val 50000"/>
             </a:avLst>
           </a:prstGeom>
           <a:ln w="15875">
@@ -10044,13 +9850,13 @@
           <p:nvPr/>
         </p:nvCxnSpPr>
         <p:spPr>
-          <a:xfrm flipV="1">
-            <a:off x="3572627" y="5034844"/>
-            <a:ext cx="1535594" cy="849881"/>
+          <a:xfrm>
+            <a:off x="3218086" y="4721798"/>
+            <a:ext cx="1919632" cy="1050464"/>
           </a:xfrm>
           <a:prstGeom prst="bentConnector3">
             <a:avLst>
-              <a:gd name="adj1" fmla="val 55333"/>
+              <a:gd name="adj1" fmla="val 63088"/>
             </a:avLst>
           </a:prstGeom>
           <a:ln w="15875">

</xml_diff>